<commit_message>
Add missing if statement slide
</commit_message>
<xml_diff>
--- a/session_three/session_three_presentation.pptx
+++ b/session_three/session_three_presentation.pptx
@@ -8,10 +8,10 @@
     <p:sldMasterId id="2147483656" r:id="rId8"/>
   </p:sldMasterIdLst>
   <p:notesMasterIdLst>
-    <p:notesMasterId r:id="rId28"/>
+    <p:notesMasterId r:id="rId29"/>
   </p:notesMasterIdLst>
   <p:handoutMasterIdLst>
-    <p:handoutMasterId r:id="rId29"/>
+    <p:handoutMasterId r:id="rId30"/>
   </p:handoutMasterIdLst>
   <p:sldIdLst>
     <p:sldId id="358" r:id="rId9"/>
@@ -25,19 +25,20 @@
     <p:sldId id="429" r:id="rId17"/>
     <p:sldId id="430" r:id="rId18"/>
     <p:sldId id="431" r:id="rId19"/>
-    <p:sldId id="432" r:id="rId20"/>
-    <p:sldId id="433" r:id="rId21"/>
-    <p:sldId id="434" r:id="rId22"/>
-    <p:sldId id="435" r:id="rId23"/>
-    <p:sldId id="436" r:id="rId24"/>
-    <p:sldId id="437" r:id="rId25"/>
-    <p:sldId id="438" r:id="rId26"/>
-    <p:sldId id="439" r:id="rId27"/>
+    <p:sldId id="440" r:id="rId20"/>
+    <p:sldId id="432" r:id="rId21"/>
+    <p:sldId id="433" r:id="rId22"/>
+    <p:sldId id="434" r:id="rId23"/>
+    <p:sldId id="435" r:id="rId24"/>
+    <p:sldId id="436" r:id="rId25"/>
+    <p:sldId id="437" r:id="rId26"/>
+    <p:sldId id="438" r:id="rId27"/>
+    <p:sldId id="439" r:id="rId28"/>
   </p:sldIdLst>
   <p:sldSz cx="9144000" cy="5143500" type="screen16x9"/>
   <p:notesSz cx="6670675" cy="9875838"/>
   <p:custDataLst>
-    <p:tags r:id="rId30"/>
+    <p:tags r:id="rId31"/>
   </p:custDataLst>
   <p:defaultTextStyle>
     <a:defPPr>
@@ -187,6 +188,9 @@
     <pc:chgData name="Bradley, Sam" userId="S::kwgk592@astrazeneca.net::f75c196c-0419-4ed7-9101-2e14ae32ff77" providerId="AD" clId="Web-{0224862F-D625-4ACA-AA88-F501D6113382}"/>
   </pc:docChgLst>
   <pc:docChgLst>
+    <pc:chgData name="Whittaker, Ryan" userId="S::kbqc931@astrazeneca.net::873b3a98-b8cc-426f-9da0-8dcfa40dc643" providerId="AD" clId="Web-{3CD0F431-51DF-40C2-BD51-649D9270BCA3}"/>
+  </pc:docChgLst>
+  <pc:docChgLst>
     <pc:chgData name="McKinney, David" userId="8b945cb3-78ce-42d7-adc5-b07bab32cd5b" providerId="ADAL" clId="{27DA46D1-4CFF-4F57-B893-F188B7B63A2A}"/>
     <pc:docChg chg="custSel modSld">
       <pc:chgData name="McKinney, David" userId="8b945cb3-78ce-42d7-adc5-b07bab32cd5b" providerId="ADAL" clId="{27DA46D1-4CFF-4F57-B893-F188B7B63A2A}" dt="2020-02-28T16:34:28.363" v="152" actId="1076"/>
@@ -240,9 +244,6 @@
         </pc:picChg>
       </pc:sldChg>
     </pc:docChg>
-  </pc:docChgLst>
-  <pc:docChgLst>
-    <pc:chgData name="Whittaker, Ryan" userId="S::kbqc931@astrazeneca.net::873b3a98-b8cc-426f-9da0-8dcfa40dc643" providerId="AD" clId="Web-{3CD0F431-51DF-40C2-BD51-649D9270BCA3}"/>
   </pc:docChgLst>
   <pc:docChgLst>
     <pc:chgData name="McKinney, David" userId="8b945cb3-78ce-42d7-adc5-b07bab32cd5b" providerId="ADAL" clId="{3DD7EA22-7276-4B32-A5EF-ECEBFF479BE2}"/>
@@ -867,7 +868,7 @@
             <a:fld id="{3BBED7E8-0829-F34C-B479-A757805E6C1B}" type="datetimeFigureOut">
               <a:rPr lang="en-US" smtClean="0"/>
               <a:pPr/>
-              <a:t>4/4/2020</a:t>
+              <a:t>4/7/2020</a:t>
             </a:fld>
             <a:endParaRPr lang="en-US"/>
           </a:p>
@@ -1035,7 +1036,7 @@
             <a:fld id="{6C7E4F11-7667-5045-A00B-01970EA44BB5}" type="datetimeFigureOut">
               <a:rPr lang="en-US" smtClean="0"/>
               <a:pPr/>
-              <a:t>4/4/2020</a:t>
+              <a:t>4/7/2020</a:t>
             </a:fld>
             <a:endParaRPr lang="en-US"/>
           </a:p>
@@ -27912,21 +27913,7 @@
                 <a:latin typeface="Arial"/>
                 <a:cs typeface="Arial"/>
               </a:rPr>
-              <a:t>Control Flow—</a:t>
-            </a:r>
-            <a:r>
-              <a:rPr lang="en-GB" dirty="0" err="1">
-                <a:latin typeface="Arial"/>
-                <a:cs typeface="Arial"/>
-              </a:rPr>
-              <a:t>Elif</a:t>
-            </a:r>
-            <a:r>
-              <a:rPr lang="en-GB" dirty="0">
-                <a:latin typeface="Arial"/>
-                <a:cs typeface="Arial"/>
-              </a:rPr>
-              <a:t> Statements</a:t>
+              <a:t>Control Flow—If Statements</a:t>
             </a:r>
             <a:endParaRPr lang="en-GB" dirty="0"/>
           </a:p>
@@ -28163,7 +28150,7 @@
                 <a:latin typeface="Arial"/>
                 <a:cs typeface="Arial"/>
               </a:rPr>
-              <a:t>Perhaps we have more than one case we wish to check</a:t>
+              <a:t>We can add logic to our code using `if` statements</a:t>
             </a:r>
           </a:p>
           <a:p>
@@ -28176,21 +28163,20 @@
                 <a:latin typeface="Arial"/>
                 <a:cs typeface="Arial"/>
               </a:rPr>
-              <a:t>In this case we can follow the `if` statement with an `</a:t>
-            </a:r>
-            <a:r>
-              <a:rPr lang="en-GB" sz="2000" dirty="0" err="1">
-                <a:latin typeface="Arial"/>
-                <a:cs typeface="Arial"/>
-              </a:rPr>
-              <a:t>elif</a:t>
-            </a:r>
+              <a:t>These accept a Boolean value (likely a comparison or Boolean expression) and run code only if it is `True`</a:t>
+            </a:r>
+          </a:p>
+          <a:p>
+            <a:pPr marL="342900" indent="-342900">
+              <a:buFont typeface="Arial"/>
+              <a:buChar char="•"/>
+            </a:pPr>
             <a:r>
               <a:rPr lang="en-GB" sz="2000" dirty="0">
                 <a:latin typeface="Arial"/>
                 <a:cs typeface="Arial"/>
               </a:rPr>
-              <a:t>` statement</a:t>
+              <a:t>We write an `if` statement by using the `if` keyword, followed by our condition and a semi-colon</a:t>
             </a:r>
           </a:p>
           <a:p>
@@ -28203,58 +28189,17 @@
                 <a:latin typeface="Arial"/>
                 <a:cs typeface="Arial"/>
               </a:rPr>
-              <a:t>The syntax is the same (`</a:t>
-            </a:r>
-            <a:r>
-              <a:rPr lang="en-GB" sz="2000" dirty="0" err="1">
-                <a:latin typeface="Arial"/>
-                <a:cs typeface="Arial"/>
-              </a:rPr>
-              <a:t>elif</a:t>
-            </a:r>
-            <a:r>
-              <a:rPr lang="en-GB" sz="2000" dirty="0">
-                <a:latin typeface="Arial"/>
-                <a:cs typeface="Arial"/>
-              </a:rPr>
-              <a:t>`, condition, colon, indented block)</a:t>
-            </a:r>
-          </a:p>
-          <a:p>
-            <a:pPr marL="342900" indent="-342900">
-              <a:buFont typeface="Arial"/>
-              <a:buChar char="•"/>
-            </a:pPr>
-            <a:r>
-              <a:rPr lang="en-GB" sz="2000" dirty="0">
-                <a:latin typeface="Arial"/>
-                <a:cs typeface="Arial"/>
-              </a:rPr>
-              <a:t>The `</a:t>
-            </a:r>
-            <a:r>
-              <a:rPr lang="en-GB" sz="2000" dirty="0" err="1">
-                <a:latin typeface="Arial"/>
-                <a:cs typeface="Arial"/>
-              </a:rPr>
-              <a:t>elif</a:t>
-            </a:r>
-            <a:r>
-              <a:rPr lang="en-GB" sz="2000" dirty="0">
-                <a:latin typeface="Arial"/>
-                <a:cs typeface="Arial"/>
-              </a:rPr>
-              <a:t>` statement will only run if the condition in the `if` statement was false</a:t>
+              <a:t>We then indent any lines of code that should only be ran if the condition is True. We unindent to end the `if` statement</a:t>
             </a:r>
           </a:p>
         </p:txBody>
       </p:sp>
       <p:pic>
         <p:nvPicPr>
-          <p:cNvPr id="17" name="Picture 16">
+          <p:cNvPr id="3" name="Picture 2">
             <a:extLst>
               <a:ext uri="{FF2B5EF4-FFF2-40B4-BE49-F238E27FC236}">
-                <a16:creationId xmlns:a16="http://schemas.microsoft.com/office/drawing/2014/main" id="{3841D7AD-8C98-4700-AFA5-88AC928C0F33}"/>
+                <a16:creationId xmlns:a16="http://schemas.microsoft.com/office/drawing/2014/main" id="{FB566B3B-E315-4338-91F5-92DCEB8634F2}"/>
               </a:ext>
             </a:extLst>
           </p:cNvPr>
@@ -28271,8 +28216,8 @@
         </p:blipFill>
         <p:spPr>
           <a:xfrm>
-            <a:off x="714375" y="2571750"/>
-            <a:ext cx="2341535" cy="1815036"/>
+            <a:off x="1059452" y="3175039"/>
+            <a:ext cx="3107600" cy="1553800"/>
           </a:xfrm>
           <a:prstGeom prst="rect">
             <a:avLst/>
@@ -28281,10 +28226,10 @@
       </p:pic>
       <p:pic>
         <p:nvPicPr>
-          <p:cNvPr id="18" name="Picture 17">
+          <p:cNvPr id="5" name="Picture 4">
             <a:extLst>
               <a:ext uri="{FF2B5EF4-FFF2-40B4-BE49-F238E27FC236}">
-                <a16:creationId xmlns:a16="http://schemas.microsoft.com/office/drawing/2014/main" id="{816E4340-C279-40B6-BB08-89FD740C1B81}"/>
+                <a16:creationId xmlns:a16="http://schemas.microsoft.com/office/drawing/2014/main" id="{4D811B52-9A1B-4493-8D83-5DCE2FA79517}"/>
               </a:ext>
             </a:extLst>
           </p:cNvPr>
@@ -28301,38 +28246,8 @@
         </p:blipFill>
         <p:spPr>
           <a:xfrm>
-            <a:off x="3401232" y="2571750"/>
-            <a:ext cx="2341535" cy="1882956"/>
-          </a:xfrm>
-          <a:prstGeom prst="rect">
-            <a:avLst/>
-          </a:prstGeom>
-        </p:spPr>
-      </p:pic>
-      <p:pic>
-        <p:nvPicPr>
-          <p:cNvPr id="19" name="Picture 18">
-            <a:extLst>
-              <a:ext uri="{FF2B5EF4-FFF2-40B4-BE49-F238E27FC236}">
-                <a16:creationId xmlns:a16="http://schemas.microsoft.com/office/drawing/2014/main" id="{8A122822-0C62-41C7-9FFB-AE5EB49190C1}"/>
-              </a:ext>
-            </a:extLst>
-          </p:cNvPr>
-          <p:cNvPicPr>
-            <a:picLocks noChangeAspect="1"/>
-          </p:cNvPicPr>
-          <p:nvPr/>
-        </p:nvPicPr>
-        <p:blipFill>
-          <a:blip r:embed="rId5"/>
-          <a:stretch>
-            <a:fillRect/>
-          </a:stretch>
-        </p:blipFill>
-        <p:spPr>
-          <a:xfrm>
-            <a:off x="6088089" y="2571750"/>
-            <a:ext cx="2341535" cy="1711938"/>
+            <a:off x="4864750" y="3175039"/>
+            <a:ext cx="3219798" cy="1423244"/>
           </a:xfrm>
           <a:prstGeom prst="rect">
             <a:avLst/>
@@ -28342,7 +28257,7 @@
     </p:spTree>
     <p:extLst>
       <p:ext uri="{BB962C8B-B14F-4D97-AF65-F5344CB8AC3E}">
-        <p14:creationId xmlns:p14="http://schemas.microsoft.com/office/powerpoint/2010/main" val="3790333988"/>
+        <p14:creationId xmlns:p14="http://schemas.microsoft.com/office/powerpoint/2010/main" val="896125717"/>
       </p:ext>
     </p:extLst>
   </p:cSld>
@@ -28395,7 +28310,21 @@
                 <a:latin typeface="Arial"/>
                 <a:cs typeface="Arial"/>
               </a:rPr>
-              <a:t>Control Flow—Else Statements</a:t>
+              <a:t>Control Flow—</a:t>
+            </a:r>
+            <a:r>
+              <a:rPr lang="en-GB" dirty="0" err="1">
+                <a:latin typeface="Arial"/>
+                <a:cs typeface="Arial"/>
+              </a:rPr>
+              <a:t>Elif</a:t>
+            </a:r>
+            <a:r>
+              <a:rPr lang="en-GB" dirty="0">
+                <a:latin typeface="Arial"/>
+                <a:cs typeface="Arial"/>
+              </a:rPr>
+              <a:t> Statements</a:t>
             </a:r>
             <a:endParaRPr lang="en-GB" dirty="0"/>
           </a:p>
@@ -28426,6 +28355,475 @@
               <a:rPr lang="en-GB" smtClean="0"/>
               <a:pPr/>
               <a:t>13</a:t>
+            </a:fld>
+            <a:endParaRPr lang="en-GB"/>
+          </a:p>
+        </p:txBody>
+      </p:sp>
+      <p:pic>
+        <p:nvPicPr>
+          <p:cNvPr id="7" name="Picture 6">
+            <a:extLst>
+              <a:ext uri="{FF2B5EF4-FFF2-40B4-BE49-F238E27FC236}">
+                <a16:creationId xmlns:a16="http://schemas.microsoft.com/office/drawing/2014/main" id="{0A9CCCDE-38BA-407D-B893-4D4CD96670C2}"/>
+              </a:ext>
+            </a:extLst>
+          </p:cNvPr>
+          <p:cNvPicPr>
+            <a:picLocks noChangeAspect="1"/>
+          </p:cNvPicPr>
+          <p:nvPr/>
+        </p:nvPicPr>
+        <p:blipFill rotWithShape="1">
+          <a:blip r:embed="rId2"/>
+          <a:srcRect l="2982" t="3174" r="2869" b="2900"/>
+          <a:stretch/>
+        </p:blipFill>
+        <p:spPr>
+          <a:xfrm>
+            <a:off x="8576572" y="4598283"/>
+            <a:ext cx="498106" cy="496941"/>
+          </a:xfrm>
+          <a:prstGeom prst="ellipse">
+            <a:avLst/>
+          </a:prstGeom>
+        </p:spPr>
+      </p:pic>
+      <p:sp>
+        <p:nvSpPr>
+          <p:cNvPr id="12" name="Text Placeholder 2">
+            <a:extLst>
+              <a:ext uri="{FF2B5EF4-FFF2-40B4-BE49-F238E27FC236}">
+                <a16:creationId xmlns:a16="http://schemas.microsoft.com/office/drawing/2014/main" id="{36954058-9419-4F9C-B0F6-39EA030C3A55}"/>
+              </a:ext>
+            </a:extLst>
+          </p:cNvPr>
+          <p:cNvSpPr txBox="1">
+            <a:spLocks/>
+          </p:cNvSpPr>
+          <p:nvPr/>
+        </p:nvSpPr>
+        <p:spPr>
+          <a:xfrm>
+            <a:off x="237061" y="712956"/>
+            <a:ext cx="8589439" cy="3885327"/>
+          </a:xfrm>
+          <a:prstGeom prst="rect">
+            <a:avLst/>
+          </a:prstGeom>
+        </p:spPr>
+        <p:txBody>
+          <a:bodyPr vert="horz" anchor="t"/>
+          <a:lstStyle>
+            <a:lvl1pPr marL="0" indent="0" algn="l" defTabSz="457200" rtl="0" eaLnBrk="1" latinLnBrk="0" hangingPunct="1">
+              <a:spcBef>
+                <a:spcPts val="0"/>
+              </a:spcBef>
+              <a:buFont typeface="Arial"/>
+              <a:buNone/>
+              <a:defRPr sz="2400" kern="1200" baseline="0">
+                <a:solidFill>
+                  <a:schemeClr val="tx1"/>
+                </a:solidFill>
+                <a:latin typeface="Arial" pitchFamily="34" charset="0"/>
+                <a:ea typeface="+mn-ea"/>
+                <a:cs typeface="Arial" pitchFamily="34" charset="0"/>
+              </a:defRPr>
+            </a:lvl1pPr>
+            <a:lvl2pPr marL="457200" indent="0" algn="l" defTabSz="457200" rtl="0" eaLnBrk="1" latinLnBrk="0" hangingPunct="1">
+              <a:spcBef>
+                <a:spcPct val="20000"/>
+              </a:spcBef>
+              <a:buFont typeface="Arial"/>
+              <a:buNone/>
+              <a:defRPr sz="2400" kern="1200">
+                <a:solidFill>
+                  <a:schemeClr val="tx1"/>
+                </a:solidFill>
+                <a:latin typeface="+mn-lt"/>
+                <a:ea typeface="+mn-ea"/>
+                <a:cs typeface="+mn-cs"/>
+              </a:defRPr>
+            </a:lvl2pPr>
+            <a:lvl3pPr marL="914400" indent="0" algn="l" defTabSz="457200" rtl="0" eaLnBrk="1" latinLnBrk="0" hangingPunct="1">
+              <a:spcBef>
+                <a:spcPct val="20000"/>
+              </a:spcBef>
+              <a:buFont typeface="Arial"/>
+              <a:buNone/>
+              <a:defRPr sz="2400" kern="1200">
+                <a:solidFill>
+                  <a:schemeClr val="tx1"/>
+                </a:solidFill>
+                <a:latin typeface="+mn-lt"/>
+                <a:ea typeface="+mn-ea"/>
+                <a:cs typeface="+mn-cs"/>
+              </a:defRPr>
+            </a:lvl3pPr>
+            <a:lvl4pPr marL="1371600" indent="0" algn="l" defTabSz="457200" rtl="0" eaLnBrk="1" latinLnBrk="0" hangingPunct="1">
+              <a:spcBef>
+                <a:spcPct val="20000"/>
+              </a:spcBef>
+              <a:buFont typeface="Arial"/>
+              <a:buNone/>
+              <a:defRPr sz="2400" kern="1200">
+                <a:solidFill>
+                  <a:schemeClr val="tx1"/>
+                </a:solidFill>
+                <a:latin typeface="+mn-lt"/>
+                <a:ea typeface="+mn-ea"/>
+                <a:cs typeface="+mn-cs"/>
+              </a:defRPr>
+            </a:lvl4pPr>
+            <a:lvl5pPr marL="1828800" indent="0" algn="l" defTabSz="457200" rtl="0" eaLnBrk="1" latinLnBrk="0" hangingPunct="1">
+              <a:spcBef>
+                <a:spcPct val="20000"/>
+              </a:spcBef>
+              <a:buFont typeface="Arial"/>
+              <a:buNone/>
+              <a:defRPr sz="2400" kern="1200">
+                <a:solidFill>
+                  <a:schemeClr val="tx1"/>
+                </a:solidFill>
+                <a:latin typeface="+mn-lt"/>
+                <a:ea typeface="+mn-ea"/>
+                <a:cs typeface="+mn-cs"/>
+              </a:defRPr>
+            </a:lvl5pPr>
+            <a:lvl6pPr marL="2514600" indent="-228600" algn="l" defTabSz="457200" rtl="0" eaLnBrk="1" latinLnBrk="0" hangingPunct="1">
+              <a:spcBef>
+                <a:spcPct val="20000"/>
+              </a:spcBef>
+              <a:buFont typeface="Arial"/>
+              <a:buChar char="•"/>
+              <a:defRPr sz="2000" kern="1200">
+                <a:solidFill>
+                  <a:schemeClr val="tx1"/>
+                </a:solidFill>
+                <a:latin typeface="+mn-lt"/>
+                <a:ea typeface="+mn-ea"/>
+                <a:cs typeface="+mn-cs"/>
+              </a:defRPr>
+            </a:lvl6pPr>
+            <a:lvl7pPr marL="2971800" indent="-228600" algn="l" defTabSz="457200" rtl="0" eaLnBrk="1" latinLnBrk="0" hangingPunct="1">
+              <a:spcBef>
+                <a:spcPct val="20000"/>
+              </a:spcBef>
+              <a:buFont typeface="Arial"/>
+              <a:buChar char="•"/>
+              <a:defRPr sz="2000" kern="1200">
+                <a:solidFill>
+                  <a:schemeClr val="tx1"/>
+                </a:solidFill>
+                <a:latin typeface="+mn-lt"/>
+                <a:ea typeface="+mn-ea"/>
+                <a:cs typeface="+mn-cs"/>
+              </a:defRPr>
+            </a:lvl7pPr>
+            <a:lvl8pPr marL="3429000" indent="-228600" algn="l" defTabSz="457200" rtl="0" eaLnBrk="1" latinLnBrk="0" hangingPunct="1">
+              <a:spcBef>
+                <a:spcPct val="20000"/>
+              </a:spcBef>
+              <a:buFont typeface="Arial"/>
+              <a:buChar char="•"/>
+              <a:defRPr sz="2000" kern="1200">
+                <a:solidFill>
+                  <a:schemeClr val="tx1"/>
+                </a:solidFill>
+                <a:latin typeface="+mn-lt"/>
+                <a:ea typeface="+mn-ea"/>
+                <a:cs typeface="+mn-cs"/>
+              </a:defRPr>
+            </a:lvl8pPr>
+            <a:lvl9pPr marL="3886200" indent="-228600" algn="l" defTabSz="457200" rtl="0" eaLnBrk="1" latinLnBrk="0" hangingPunct="1">
+              <a:spcBef>
+                <a:spcPct val="20000"/>
+              </a:spcBef>
+              <a:buFont typeface="Arial"/>
+              <a:buChar char="•"/>
+              <a:defRPr sz="2000" kern="1200">
+                <a:solidFill>
+                  <a:schemeClr val="tx1"/>
+                </a:solidFill>
+                <a:latin typeface="+mn-lt"/>
+                <a:ea typeface="+mn-ea"/>
+                <a:cs typeface="+mn-cs"/>
+              </a:defRPr>
+            </a:lvl9pPr>
+          </a:lstStyle>
+          <a:p>
+            <a:pPr marL="342900" indent="-342900">
+              <a:buFont typeface="Arial"/>
+              <a:buChar char="•"/>
+            </a:pPr>
+            <a:r>
+              <a:rPr lang="en-GB" sz="2000" dirty="0">
+                <a:latin typeface="Arial"/>
+                <a:cs typeface="Arial"/>
+              </a:rPr>
+              <a:t>Perhaps we have more than one case we wish to check</a:t>
+            </a:r>
+          </a:p>
+          <a:p>
+            <a:pPr marL="342900" indent="-342900">
+              <a:buFont typeface="Arial"/>
+              <a:buChar char="•"/>
+            </a:pPr>
+            <a:r>
+              <a:rPr lang="en-GB" sz="2000" dirty="0">
+                <a:latin typeface="Arial"/>
+                <a:cs typeface="Arial"/>
+              </a:rPr>
+              <a:t>In this case we can follow the `if` statement with an `</a:t>
+            </a:r>
+            <a:r>
+              <a:rPr lang="en-GB" sz="2000" dirty="0" err="1">
+                <a:latin typeface="Arial"/>
+                <a:cs typeface="Arial"/>
+              </a:rPr>
+              <a:t>elif</a:t>
+            </a:r>
+            <a:r>
+              <a:rPr lang="en-GB" sz="2000" dirty="0">
+                <a:latin typeface="Arial"/>
+                <a:cs typeface="Arial"/>
+              </a:rPr>
+              <a:t>` statement</a:t>
+            </a:r>
+          </a:p>
+          <a:p>
+            <a:pPr marL="342900" indent="-342900">
+              <a:buFont typeface="Arial"/>
+              <a:buChar char="•"/>
+            </a:pPr>
+            <a:r>
+              <a:rPr lang="en-GB" sz="2000" dirty="0">
+                <a:latin typeface="Arial"/>
+                <a:cs typeface="Arial"/>
+              </a:rPr>
+              <a:t>The syntax is the same (`</a:t>
+            </a:r>
+            <a:r>
+              <a:rPr lang="en-GB" sz="2000" dirty="0" err="1">
+                <a:latin typeface="Arial"/>
+                <a:cs typeface="Arial"/>
+              </a:rPr>
+              <a:t>elif</a:t>
+            </a:r>
+            <a:r>
+              <a:rPr lang="en-GB" sz="2000" dirty="0">
+                <a:latin typeface="Arial"/>
+                <a:cs typeface="Arial"/>
+              </a:rPr>
+              <a:t>`, condition, colon, indented block)</a:t>
+            </a:r>
+          </a:p>
+          <a:p>
+            <a:pPr marL="342900" indent="-342900">
+              <a:buFont typeface="Arial"/>
+              <a:buChar char="•"/>
+            </a:pPr>
+            <a:r>
+              <a:rPr lang="en-GB" sz="2000" dirty="0">
+                <a:latin typeface="Arial"/>
+                <a:cs typeface="Arial"/>
+              </a:rPr>
+              <a:t>The `</a:t>
+            </a:r>
+            <a:r>
+              <a:rPr lang="en-GB" sz="2000" dirty="0" err="1">
+                <a:latin typeface="Arial"/>
+                <a:cs typeface="Arial"/>
+              </a:rPr>
+              <a:t>elif</a:t>
+            </a:r>
+            <a:r>
+              <a:rPr lang="en-GB" sz="2000" dirty="0">
+                <a:latin typeface="Arial"/>
+                <a:cs typeface="Arial"/>
+              </a:rPr>
+              <a:t>` statement will only run if the condition in the `if` statement was false</a:t>
+            </a:r>
+          </a:p>
+        </p:txBody>
+      </p:sp>
+      <p:pic>
+        <p:nvPicPr>
+          <p:cNvPr id="17" name="Picture 16">
+            <a:extLst>
+              <a:ext uri="{FF2B5EF4-FFF2-40B4-BE49-F238E27FC236}">
+                <a16:creationId xmlns:a16="http://schemas.microsoft.com/office/drawing/2014/main" id="{3841D7AD-8C98-4700-AFA5-88AC928C0F33}"/>
+              </a:ext>
+            </a:extLst>
+          </p:cNvPr>
+          <p:cNvPicPr>
+            <a:picLocks noChangeAspect="1"/>
+          </p:cNvPicPr>
+          <p:nvPr/>
+        </p:nvPicPr>
+        <p:blipFill>
+          <a:blip r:embed="rId3"/>
+          <a:stretch>
+            <a:fillRect/>
+          </a:stretch>
+        </p:blipFill>
+        <p:spPr>
+          <a:xfrm>
+            <a:off x="714375" y="2571750"/>
+            <a:ext cx="2341535" cy="1815036"/>
+          </a:xfrm>
+          <a:prstGeom prst="rect">
+            <a:avLst/>
+          </a:prstGeom>
+        </p:spPr>
+      </p:pic>
+      <p:pic>
+        <p:nvPicPr>
+          <p:cNvPr id="18" name="Picture 17">
+            <a:extLst>
+              <a:ext uri="{FF2B5EF4-FFF2-40B4-BE49-F238E27FC236}">
+                <a16:creationId xmlns:a16="http://schemas.microsoft.com/office/drawing/2014/main" id="{816E4340-C279-40B6-BB08-89FD740C1B81}"/>
+              </a:ext>
+            </a:extLst>
+          </p:cNvPr>
+          <p:cNvPicPr>
+            <a:picLocks noChangeAspect="1"/>
+          </p:cNvPicPr>
+          <p:nvPr/>
+        </p:nvPicPr>
+        <p:blipFill>
+          <a:blip r:embed="rId4"/>
+          <a:stretch>
+            <a:fillRect/>
+          </a:stretch>
+        </p:blipFill>
+        <p:spPr>
+          <a:xfrm>
+            <a:off x="3401232" y="2571750"/>
+            <a:ext cx="2341535" cy="1882956"/>
+          </a:xfrm>
+          <a:prstGeom prst="rect">
+            <a:avLst/>
+          </a:prstGeom>
+        </p:spPr>
+      </p:pic>
+      <p:pic>
+        <p:nvPicPr>
+          <p:cNvPr id="19" name="Picture 18">
+            <a:extLst>
+              <a:ext uri="{FF2B5EF4-FFF2-40B4-BE49-F238E27FC236}">
+                <a16:creationId xmlns:a16="http://schemas.microsoft.com/office/drawing/2014/main" id="{8A122822-0C62-41C7-9FFB-AE5EB49190C1}"/>
+              </a:ext>
+            </a:extLst>
+          </p:cNvPr>
+          <p:cNvPicPr>
+            <a:picLocks noChangeAspect="1"/>
+          </p:cNvPicPr>
+          <p:nvPr/>
+        </p:nvPicPr>
+        <p:blipFill>
+          <a:blip r:embed="rId5"/>
+          <a:stretch>
+            <a:fillRect/>
+          </a:stretch>
+        </p:blipFill>
+        <p:spPr>
+          <a:xfrm>
+            <a:off x="6088089" y="2571750"/>
+            <a:ext cx="2341535" cy="1711938"/>
+          </a:xfrm>
+          <a:prstGeom prst="rect">
+            <a:avLst/>
+          </a:prstGeom>
+        </p:spPr>
+      </p:pic>
+    </p:spTree>
+    <p:extLst>
+      <p:ext uri="{BB962C8B-B14F-4D97-AF65-F5344CB8AC3E}">
+        <p14:creationId xmlns:p14="http://schemas.microsoft.com/office/powerpoint/2010/main" val="3790333988"/>
+      </p:ext>
+    </p:extLst>
+  </p:cSld>
+  <p:clrMapOvr>
+    <a:masterClrMapping/>
+  </p:clrMapOvr>
+</p:sld>
+</file>
+
+<file path=ppt/slides/slide14.xml><?xml version="1.0" encoding="utf-8"?>
+<p:sld xmlns:a="http://schemas.openxmlformats.org/drawingml/2006/main" xmlns:r="http://schemas.openxmlformats.org/officeDocument/2006/relationships" xmlns:p="http://schemas.openxmlformats.org/presentationml/2006/main" showMasterSp="0">
+  <p:cSld>
+    <p:spTree>
+      <p:nvGrpSpPr>
+        <p:cNvPr id="1" name=""/>
+        <p:cNvGrpSpPr/>
+        <p:nvPr/>
+      </p:nvGrpSpPr>
+      <p:grpSpPr>
+        <a:xfrm>
+          <a:off x="0" y="0"/>
+          <a:ext cx="0" cy="0"/>
+          <a:chOff x="0" y="0"/>
+          <a:chExt cx="0" cy="0"/>
+        </a:xfrm>
+      </p:grpSpPr>
+      <p:sp>
+        <p:nvSpPr>
+          <p:cNvPr id="2" name="Title 1">
+            <a:extLst>
+              <a:ext uri="{FF2B5EF4-FFF2-40B4-BE49-F238E27FC236}">
+                <a16:creationId xmlns:a16="http://schemas.microsoft.com/office/drawing/2014/main" id="{6FF1181F-0C76-47D0-83D2-2133FE38FB6F}"/>
+              </a:ext>
+            </a:extLst>
+          </p:cNvPr>
+          <p:cNvSpPr>
+            <a:spLocks noGrp="1"/>
+          </p:cNvSpPr>
+          <p:nvPr>
+            <p:ph type="title"/>
+          </p:nvPr>
+        </p:nvSpPr>
+        <p:spPr/>
+        <p:txBody>
+          <a:bodyPr vert="horz" anchor="t"/>
+          <a:lstStyle/>
+          <a:p>
+            <a:r>
+              <a:rPr lang="en-GB" dirty="0">
+                <a:latin typeface="Arial"/>
+                <a:cs typeface="Arial"/>
+              </a:rPr>
+              <a:t>Control Flow—Else Statements</a:t>
+            </a:r>
+            <a:endParaRPr lang="en-GB" dirty="0"/>
+          </a:p>
+        </p:txBody>
+      </p:sp>
+      <p:sp>
+        <p:nvSpPr>
+          <p:cNvPr id="4" name="Slide Number Placeholder 3">
+            <a:extLst>
+              <a:ext uri="{FF2B5EF4-FFF2-40B4-BE49-F238E27FC236}">
+                <a16:creationId xmlns:a16="http://schemas.microsoft.com/office/drawing/2014/main" id="{CCA97D33-0674-4F0A-9450-AA6A3EE0628D}"/>
+              </a:ext>
+            </a:extLst>
+          </p:cNvPr>
+          <p:cNvSpPr>
+            <a:spLocks noGrp="1"/>
+          </p:cNvSpPr>
+          <p:nvPr>
+            <p:ph type="sldNum" sz="quarter" idx="4"/>
+          </p:nvPr>
+        </p:nvSpPr>
+        <p:spPr/>
+        <p:txBody>
+          <a:bodyPr/>
+          <a:lstStyle/>
+          <a:p>
+            <a:fld id="{3C4F54F3-C349-4609-AFEE-01462D5C7942}" type="slidenum">
+              <a:rPr lang="en-GB" smtClean="0"/>
+              <a:pPr/>
+              <a:t>14</a:t>
             </a:fld>
             <a:endParaRPr lang="en-GB"/>
           </a:p>
@@ -29174,7 +29572,7 @@
 </p:sld>
 </file>
 
-<file path=ppt/slides/slide14.xml><?xml version="1.0" encoding="utf-8"?>
+<file path=ppt/slides/slide15.xml><?xml version="1.0" encoding="utf-8"?>
 <p:sld xmlns:a="http://schemas.openxmlformats.org/drawingml/2006/main" xmlns:r="http://schemas.openxmlformats.org/officeDocument/2006/relationships" xmlns:p="http://schemas.openxmlformats.org/presentationml/2006/main" showMasterSp="0">
   <p:cSld>
     <p:spTree>
@@ -29247,7 +29645,7 @@
             <a:fld id="{3C4F54F3-C349-4609-AFEE-01462D5C7942}" type="slidenum">
               <a:rPr lang="en-GB" smtClean="0"/>
               <a:pPr/>
-              <a:t>14</a:t>
+              <a:t>15</a:t>
             </a:fld>
             <a:endParaRPr lang="en-GB"/>
           </a:p>
@@ -29573,187 +29971,6 @@
     <p:extLst>
       <p:ext uri="{BB962C8B-B14F-4D97-AF65-F5344CB8AC3E}">
         <p14:creationId xmlns:p14="http://schemas.microsoft.com/office/powerpoint/2010/main" val="3287260104"/>
-      </p:ext>
-    </p:extLst>
-  </p:cSld>
-  <p:clrMapOvr>
-    <a:masterClrMapping/>
-  </p:clrMapOvr>
-</p:sld>
-</file>
-
-<file path=ppt/slides/slide15.xml><?xml version="1.0" encoding="utf-8"?>
-<p:sld xmlns:a="http://schemas.openxmlformats.org/drawingml/2006/main" xmlns:r="http://schemas.openxmlformats.org/officeDocument/2006/relationships" xmlns:p="http://schemas.openxmlformats.org/presentationml/2006/main" showMasterSp="0">
-  <p:cSld>
-    <p:spTree>
-      <p:nvGrpSpPr>
-        <p:cNvPr id="1" name=""/>
-        <p:cNvGrpSpPr/>
-        <p:nvPr/>
-      </p:nvGrpSpPr>
-      <p:grpSpPr>
-        <a:xfrm>
-          <a:off x="0" y="0"/>
-          <a:ext cx="0" cy="0"/>
-          <a:chOff x="0" y="0"/>
-          <a:chExt cx="0" cy="0"/>
-        </a:xfrm>
-      </p:grpSpPr>
-      <p:sp>
-        <p:nvSpPr>
-          <p:cNvPr id="2" name="Title 1">
-            <a:extLst>
-              <a:ext uri="{FF2B5EF4-FFF2-40B4-BE49-F238E27FC236}">
-                <a16:creationId xmlns:a16="http://schemas.microsoft.com/office/drawing/2014/main" id="{6FF1181F-0C76-47D0-83D2-2133FE38FB6F}"/>
-              </a:ext>
-            </a:extLst>
-          </p:cNvPr>
-          <p:cNvSpPr>
-            <a:spLocks noGrp="1"/>
-          </p:cNvSpPr>
-          <p:nvPr>
-            <p:ph type="title"/>
-          </p:nvPr>
-        </p:nvSpPr>
-        <p:spPr/>
-        <p:txBody>
-          <a:bodyPr vert="horz" anchor="t"/>
-          <a:lstStyle/>
-          <a:p>
-            <a:r>
-              <a:rPr lang="en-GB" dirty="0">
-                <a:latin typeface="Arial"/>
-                <a:cs typeface="Arial"/>
-              </a:rPr>
-              <a:t>Control Flow Puzzles Solutions</a:t>
-            </a:r>
-            <a:endParaRPr lang="en-GB" dirty="0"/>
-          </a:p>
-        </p:txBody>
-      </p:sp>
-      <p:sp>
-        <p:nvSpPr>
-          <p:cNvPr id="4" name="Slide Number Placeholder 3">
-            <a:extLst>
-              <a:ext uri="{FF2B5EF4-FFF2-40B4-BE49-F238E27FC236}">
-                <a16:creationId xmlns:a16="http://schemas.microsoft.com/office/drawing/2014/main" id="{CCA97D33-0674-4F0A-9450-AA6A3EE0628D}"/>
-              </a:ext>
-            </a:extLst>
-          </p:cNvPr>
-          <p:cNvSpPr>
-            <a:spLocks noGrp="1"/>
-          </p:cNvSpPr>
-          <p:nvPr>
-            <p:ph type="sldNum" sz="quarter" idx="4"/>
-          </p:nvPr>
-        </p:nvSpPr>
-        <p:spPr/>
-        <p:txBody>
-          <a:bodyPr/>
-          <a:lstStyle/>
-          <a:p>
-            <a:fld id="{3C4F54F3-C349-4609-AFEE-01462D5C7942}" type="slidenum">
-              <a:rPr lang="en-GB" smtClean="0"/>
-              <a:pPr/>
-              <a:t>15</a:t>
-            </a:fld>
-            <a:endParaRPr lang="en-GB"/>
-          </a:p>
-        </p:txBody>
-      </p:sp>
-      <p:pic>
-        <p:nvPicPr>
-          <p:cNvPr id="7" name="Picture 6">
-            <a:extLst>
-              <a:ext uri="{FF2B5EF4-FFF2-40B4-BE49-F238E27FC236}">
-                <a16:creationId xmlns:a16="http://schemas.microsoft.com/office/drawing/2014/main" id="{0A9CCCDE-38BA-407D-B893-4D4CD96670C2}"/>
-              </a:ext>
-            </a:extLst>
-          </p:cNvPr>
-          <p:cNvPicPr>
-            <a:picLocks noChangeAspect="1"/>
-          </p:cNvPicPr>
-          <p:nvPr/>
-        </p:nvPicPr>
-        <p:blipFill rotWithShape="1">
-          <a:blip r:embed="rId2"/>
-          <a:srcRect l="2982" t="3174" r="2869" b="2900"/>
-          <a:stretch/>
-        </p:blipFill>
-        <p:spPr>
-          <a:xfrm>
-            <a:off x="8576572" y="4598283"/>
-            <a:ext cx="498106" cy="496941"/>
-          </a:xfrm>
-          <a:prstGeom prst="ellipse">
-            <a:avLst/>
-          </a:prstGeom>
-        </p:spPr>
-      </p:pic>
-      <p:pic>
-        <p:nvPicPr>
-          <p:cNvPr id="3" name="Picture 2">
-            <a:extLst>
-              <a:ext uri="{FF2B5EF4-FFF2-40B4-BE49-F238E27FC236}">
-                <a16:creationId xmlns:a16="http://schemas.microsoft.com/office/drawing/2014/main" id="{EC5268D5-4856-4BA4-A1B3-476A774A395A}"/>
-              </a:ext>
-            </a:extLst>
-          </p:cNvPr>
-          <p:cNvPicPr>
-            <a:picLocks noChangeAspect="1"/>
-          </p:cNvPicPr>
-          <p:nvPr/>
-        </p:nvPicPr>
-        <p:blipFill>
-          <a:blip r:embed="rId3"/>
-          <a:stretch>
-            <a:fillRect/>
-          </a:stretch>
-        </p:blipFill>
-        <p:spPr>
-          <a:xfrm>
-            <a:off x="509700" y="1144199"/>
-            <a:ext cx="3619715" cy="2855101"/>
-          </a:xfrm>
-          <a:prstGeom prst="rect">
-            <a:avLst/>
-          </a:prstGeom>
-        </p:spPr>
-      </p:pic>
-      <p:pic>
-        <p:nvPicPr>
-          <p:cNvPr id="6" name="Picture 5">
-            <a:extLst>
-              <a:ext uri="{FF2B5EF4-FFF2-40B4-BE49-F238E27FC236}">
-                <a16:creationId xmlns:a16="http://schemas.microsoft.com/office/drawing/2014/main" id="{E70EEBB8-8FBF-415A-820E-D663FDD8B5D5}"/>
-              </a:ext>
-            </a:extLst>
-          </p:cNvPr>
-          <p:cNvPicPr>
-            <a:picLocks noChangeAspect="1"/>
-          </p:cNvPicPr>
-          <p:nvPr/>
-        </p:nvPicPr>
-        <p:blipFill>
-          <a:blip r:embed="rId4"/>
-          <a:stretch>
-            <a:fillRect/>
-          </a:stretch>
-        </p:blipFill>
-        <p:spPr>
-          <a:xfrm>
-            <a:off x="4670423" y="1368263"/>
-            <a:ext cx="3963877" cy="2261672"/>
-          </a:xfrm>
-          <a:prstGeom prst="rect">
-            <a:avLst/>
-          </a:prstGeom>
-        </p:spPr>
-      </p:pic>
-    </p:spTree>
-    <p:extLst>
-      <p:ext uri="{BB962C8B-B14F-4D97-AF65-F5344CB8AC3E}">
-        <p14:creationId xmlns:p14="http://schemas.microsoft.com/office/powerpoint/2010/main" val="3401661766"/>
       </p:ext>
     </p:extLst>
   </p:cSld>
@@ -29806,7 +30023,7 @@
                 <a:latin typeface="Arial"/>
                 <a:cs typeface="Arial"/>
               </a:rPr>
-              <a:t>While Loops</a:t>
+              <a:t>Control Flow Puzzles Solutions</a:t>
             </a:r>
             <a:endParaRPr lang="en-GB" dirty="0"/>
           </a:p>
@@ -29871,268 +30088,12 @@
           </a:prstGeom>
         </p:spPr>
       </p:pic>
-      <p:sp>
-        <p:nvSpPr>
-          <p:cNvPr id="8" name="Text Placeholder 2">
+      <p:pic>
+        <p:nvPicPr>
+          <p:cNvPr id="3" name="Picture 2">
             <a:extLst>
               <a:ext uri="{FF2B5EF4-FFF2-40B4-BE49-F238E27FC236}">
-                <a16:creationId xmlns:a16="http://schemas.microsoft.com/office/drawing/2014/main" id="{AE730BAD-D4CD-4024-84D5-18B8C4B4ED90}"/>
-              </a:ext>
-            </a:extLst>
-          </p:cNvPr>
-          <p:cNvSpPr txBox="1">
-            <a:spLocks/>
-          </p:cNvSpPr>
-          <p:nvPr/>
-        </p:nvSpPr>
-        <p:spPr>
-          <a:xfrm>
-            <a:off x="237061" y="712956"/>
-            <a:ext cx="5189269" cy="3885327"/>
-          </a:xfrm>
-          <a:prstGeom prst="rect">
-            <a:avLst/>
-          </a:prstGeom>
-        </p:spPr>
-        <p:txBody>
-          <a:bodyPr vert="horz" anchor="t"/>
-          <a:lstStyle>
-            <a:lvl1pPr marL="0" indent="0" algn="l" defTabSz="457200" rtl="0" eaLnBrk="1" latinLnBrk="0" hangingPunct="1">
-              <a:spcBef>
-                <a:spcPts val="0"/>
-              </a:spcBef>
-              <a:buFont typeface="Arial"/>
-              <a:buNone/>
-              <a:defRPr sz="2400" kern="1200" baseline="0">
-                <a:solidFill>
-                  <a:schemeClr val="tx1"/>
-                </a:solidFill>
-                <a:latin typeface="Arial" pitchFamily="34" charset="0"/>
-                <a:ea typeface="+mn-ea"/>
-                <a:cs typeface="Arial" pitchFamily="34" charset="0"/>
-              </a:defRPr>
-            </a:lvl1pPr>
-            <a:lvl2pPr marL="457200" indent="0" algn="l" defTabSz="457200" rtl="0" eaLnBrk="1" latinLnBrk="0" hangingPunct="1">
-              <a:spcBef>
-                <a:spcPct val="20000"/>
-              </a:spcBef>
-              <a:buFont typeface="Arial"/>
-              <a:buNone/>
-              <a:defRPr sz="2400" kern="1200">
-                <a:solidFill>
-                  <a:schemeClr val="tx1"/>
-                </a:solidFill>
-                <a:latin typeface="+mn-lt"/>
-                <a:ea typeface="+mn-ea"/>
-                <a:cs typeface="+mn-cs"/>
-              </a:defRPr>
-            </a:lvl2pPr>
-            <a:lvl3pPr marL="914400" indent="0" algn="l" defTabSz="457200" rtl="0" eaLnBrk="1" latinLnBrk="0" hangingPunct="1">
-              <a:spcBef>
-                <a:spcPct val="20000"/>
-              </a:spcBef>
-              <a:buFont typeface="Arial"/>
-              <a:buNone/>
-              <a:defRPr sz="2400" kern="1200">
-                <a:solidFill>
-                  <a:schemeClr val="tx1"/>
-                </a:solidFill>
-                <a:latin typeface="+mn-lt"/>
-                <a:ea typeface="+mn-ea"/>
-                <a:cs typeface="+mn-cs"/>
-              </a:defRPr>
-            </a:lvl3pPr>
-            <a:lvl4pPr marL="1371600" indent="0" algn="l" defTabSz="457200" rtl="0" eaLnBrk="1" latinLnBrk="0" hangingPunct="1">
-              <a:spcBef>
-                <a:spcPct val="20000"/>
-              </a:spcBef>
-              <a:buFont typeface="Arial"/>
-              <a:buNone/>
-              <a:defRPr sz="2400" kern="1200">
-                <a:solidFill>
-                  <a:schemeClr val="tx1"/>
-                </a:solidFill>
-                <a:latin typeface="+mn-lt"/>
-                <a:ea typeface="+mn-ea"/>
-                <a:cs typeface="+mn-cs"/>
-              </a:defRPr>
-            </a:lvl4pPr>
-            <a:lvl5pPr marL="1828800" indent="0" algn="l" defTabSz="457200" rtl="0" eaLnBrk="1" latinLnBrk="0" hangingPunct="1">
-              <a:spcBef>
-                <a:spcPct val="20000"/>
-              </a:spcBef>
-              <a:buFont typeface="Arial"/>
-              <a:buNone/>
-              <a:defRPr sz="2400" kern="1200">
-                <a:solidFill>
-                  <a:schemeClr val="tx1"/>
-                </a:solidFill>
-                <a:latin typeface="+mn-lt"/>
-                <a:ea typeface="+mn-ea"/>
-                <a:cs typeface="+mn-cs"/>
-              </a:defRPr>
-            </a:lvl5pPr>
-            <a:lvl6pPr marL="2514600" indent="-228600" algn="l" defTabSz="457200" rtl="0" eaLnBrk="1" latinLnBrk="0" hangingPunct="1">
-              <a:spcBef>
-                <a:spcPct val="20000"/>
-              </a:spcBef>
-              <a:buFont typeface="Arial"/>
-              <a:buChar char="•"/>
-              <a:defRPr sz="2000" kern="1200">
-                <a:solidFill>
-                  <a:schemeClr val="tx1"/>
-                </a:solidFill>
-                <a:latin typeface="+mn-lt"/>
-                <a:ea typeface="+mn-ea"/>
-                <a:cs typeface="+mn-cs"/>
-              </a:defRPr>
-            </a:lvl6pPr>
-            <a:lvl7pPr marL="2971800" indent="-228600" algn="l" defTabSz="457200" rtl="0" eaLnBrk="1" latinLnBrk="0" hangingPunct="1">
-              <a:spcBef>
-                <a:spcPct val="20000"/>
-              </a:spcBef>
-              <a:buFont typeface="Arial"/>
-              <a:buChar char="•"/>
-              <a:defRPr sz="2000" kern="1200">
-                <a:solidFill>
-                  <a:schemeClr val="tx1"/>
-                </a:solidFill>
-                <a:latin typeface="+mn-lt"/>
-                <a:ea typeface="+mn-ea"/>
-                <a:cs typeface="+mn-cs"/>
-              </a:defRPr>
-            </a:lvl7pPr>
-            <a:lvl8pPr marL="3429000" indent="-228600" algn="l" defTabSz="457200" rtl="0" eaLnBrk="1" latinLnBrk="0" hangingPunct="1">
-              <a:spcBef>
-                <a:spcPct val="20000"/>
-              </a:spcBef>
-              <a:buFont typeface="Arial"/>
-              <a:buChar char="•"/>
-              <a:defRPr sz="2000" kern="1200">
-                <a:solidFill>
-                  <a:schemeClr val="tx1"/>
-                </a:solidFill>
-                <a:latin typeface="+mn-lt"/>
-                <a:ea typeface="+mn-ea"/>
-                <a:cs typeface="+mn-cs"/>
-              </a:defRPr>
-            </a:lvl8pPr>
-            <a:lvl9pPr marL="3886200" indent="-228600" algn="l" defTabSz="457200" rtl="0" eaLnBrk="1" latinLnBrk="0" hangingPunct="1">
-              <a:spcBef>
-                <a:spcPct val="20000"/>
-              </a:spcBef>
-              <a:buFont typeface="Arial"/>
-              <a:buChar char="•"/>
-              <a:defRPr sz="2000" kern="1200">
-                <a:solidFill>
-                  <a:schemeClr val="tx1"/>
-                </a:solidFill>
-                <a:latin typeface="+mn-lt"/>
-                <a:ea typeface="+mn-ea"/>
-                <a:cs typeface="+mn-cs"/>
-              </a:defRPr>
-            </a:lvl9pPr>
-          </a:lstStyle>
-          <a:p>
-            <a:pPr marL="342900" indent="-342900">
-              <a:buFont typeface="Arial"/>
-              <a:buChar char="•"/>
-            </a:pPr>
-            <a:r>
-              <a:rPr lang="en-GB" sz="2000" dirty="0">
-                <a:latin typeface="Arial"/>
-                <a:cs typeface="Arial"/>
-              </a:rPr>
-              <a:t>Often, we’ll want to repeatedly run code until a condition is met</a:t>
-            </a:r>
-          </a:p>
-          <a:p>
-            <a:pPr marL="342900" indent="-342900">
-              <a:buFont typeface="Arial"/>
-              <a:buChar char="•"/>
-            </a:pPr>
-            <a:r>
-              <a:rPr lang="en-GB" sz="2000" dirty="0">
-                <a:latin typeface="Arial"/>
-                <a:cs typeface="Arial"/>
-              </a:rPr>
-              <a:t>We can use while loops to achieve this</a:t>
-            </a:r>
-          </a:p>
-          <a:p>
-            <a:pPr marL="342900" indent="-342900">
-              <a:buFont typeface="Arial"/>
-              <a:buChar char="•"/>
-            </a:pPr>
-            <a:r>
-              <a:rPr lang="en-GB" sz="2000" dirty="0">
-                <a:latin typeface="Arial"/>
-                <a:cs typeface="Arial"/>
-              </a:rPr>
-              <a:t>The syntax is similar to `if`, `</a:t>
-            </a:r>
-            <a:r>
-              <a:rPr lang="en-GB" sz="2000" dirty="0" err="1">
-                <a:latin typeface="Arial"/>
-                <a:cs typeface="Arial"/>
-              </a:rPr>
-              <a:t>elif</a:t>
-            </a:r>
-            <a:r>
-              <a:rPr lang="en-GB" sz="2000" dirty="0">
-                <a:latin typeface="Arial"/>
-                <a:cs typeface="Arial"/>
-              </a:rPr>
-              <a:t>`, and `else`</a:t>
-            </a:r>
-          </a:p>
-          <a:p>
-            <a:pPr marL="342900" indent="-342900">
-              <a:buFont typeface="Arial"/>
-              <a:buChar char="•"/>
-            </a:pPr>
-            <a:r>
-              <a:rPr lang="en-GB" sz="2000" dirty="0">
-                <a:latin typeface="Arial"/>
-                <a:cs typeface="Arial"/>
-              </a:rPr>
-              <a:t>Start with a `while`, then a condition and colon</a:t>
-            </a:r>
-          </a:p>
-          <a:p>
-            <a:pPr marL="342900" indent="-342900">
-              <a:buFont typeface="Arial"/>
-              <a:buChar char="•"/>
-            </a:pPr>
-            <a:r>
-              <a:rPr lang="en-GB" sz="2000" dirty="0">
-                <a:latin typeface="Arial"/>
-                <a:cs typeface="Arial"/>
-              </a:rPr>
-              <a:t>Follow this by indented lines that will be looped whilst the condition is true</a:t>
-            </a:r>
-          </a:p>
-          <a:p>
-            <a:pPr marL="342900" indent="-342900">
-              <a:buFont typeface="Arial"/>
-              <a:buChar char="•"/>
-            </a:pPr>
-            <a:r>
-              <a:rPr lang="en-GB" sz="2000" dirty="0">
-                <a:latin typeface="Arial"/>
-                <a:cs typeface="Arial"/>
-              </a:rPr>
-              <a:t>Any lines after the indent will be ran after the loop exits</a:t>
-            </a:r>
-          </a:p>
-        </p:txBody>
-      </p:sp>
-      <p:pic>
-        <p:nvPicPr>
-          <p:cNvPr id="5" name="Picture 4">
-            <a:extLst>
-              <a:ext uri="{FF2B5EF4-FFF2-40B4-BE49-F238E27FC236}">
-                <a16:creationId xmlns:a16="http://schemas.microsoft.com/office/drawing/2014/main" id="{4AF5DC9F-03EF-4FF1-9306-D4ECDCFC6B45}"/>
+                <a16:creationId xmlns:a16="http://schemas.microsoft.com/office/drawing/2014/main" id="{EC5268D5-4856-4BA4-A1B3-476A774A395A}"/>
               </a:ext>
             </a:extLst>
           </p:cNvPr>
@@ -30149,8 +30110,38 @@
         </p:blipFill>
         <p:spPr>
           <a:xfrm>
-            <a:off x="5631828" y="1074586"/>
-            <a:ext cx="3193797" cy="2619722"/>
+            <a:off x="509700" y="1144199"/>
+            <a:ext cx="3619715" cy="2855101"/>
+          </a:xfrm>
+          <a:prstGeom prst="rect">
+            <a:avLst/>
+          </a:prstGeom>
+        </p:spPr>
+      </p:pic>
+      <p:pic>
+        <p:nvPicPr>
+          <p:cNvPr id="6" name="Picture 5">
+            <a:extLst>
+              <a:ext uri="{FF2B5EF4-FFF2-40B4-BE49-F238E27FC236}">
+                <a16:creationId xmlns:a16="http://schemas.microsoft.com/office/drawing/2014/main" id="{E70EEBB8-8FBF-415A-820E-D663FDD8B5D5}"/>
+              </a:ext>
+            </a:extLst>
+          </p:cNvPr>
+          <p:cNvPicPr>
+            <a:picLocks noChangeAspect="1"/>
+          </p:cNvPicPr>
+          <p:nvPr/>
+        </p:nvPicPr>
+        <p:blipFill>
+          <a:blip r:embed="rId4"/>
+          <a:stretch>
+            <a:fillRect/>
+          </a:stretch>
+        </p:blipFill>
+        <p:spPr>
+          <a:xfrm>
+            <a:off x="4670423" y="1368263"/>
+            <a:ext cx="3963877" cy="2261672"/>
           </a:xfrm>
           <a:prstGeom prst="rect">
             <a:avLst/>
@@ -30160,7 +30151,7 @@
     </p:spTree>
     <p:extLst>
       <p:ext uri="{BB962C8B-B14F-4D97-AF65-F5344CB8AC3E}">
-        <p14:creationId xmlns:p14="http://schemas.microsoft.com/office/powerpoint/2010/main" val="2403563581"/>
+        <p14:creationId xmlns:p14="http://schemas.microsoft.com/office/powerpoint/2010/main" val="3401661766"/>
       </p:ext>
     </p:extLst>
   </p:cSld>
@@ -30295,7 +30286,7 @@
         <p:spPr>
           <a:xfrm>
             <a:off x="237061" y="712956"/>
-            <a:ext cx="8533170" cy="3885327"/>
+            <a:ext cx="5189269" cy="3885327"/>
           </a:xfrm>
           <a:prstGeom prst="rect">
             <a:avLst/>
@@ -30450,7 +30441,7 @@
                 <a:latin typeface="Arial"/>
                 <a:cs typeface="Arial"/>
               </a:rPr>
-              <a:t>We can use while loops to validate user input</a:t>
+              <a:t>Often, we’ll want to repeatedly run code until a condition is met</a:t>
             </a:r>
           </a:p>
           <a:p>
@@ -30458,102 +30449,88 @@
               <a:buFont typeface="Arial"/>
               <a:buChar char="•"/>
             </a:pPr>
-            <a:endParaRPr lang="en-GB" sz="2000" dirty="0">
-              <a:latin typeface="Arial"/>
-              <a:cs typeface="Arial"/>
-            </a:endParaRPr>
+            <a:r>
+              <a:rPr lang="en-GB" sz="2000" dirty="0">
+                <a:latin typeface="Arial"/>
+                <a:cs typeface="Arial"/>
+              </a:rPr>
+              <a:t>We can use while loops to achieve this</a:t>
+            </a:r>
           </a:p>
           <a:p>
             <a:pPr marL="342900" indent="-342900">
               <a:buFont typeface="Arial"/>
               <a:buChar char="•"/>
             </a:pPr>
-            <a:endParaRPr lang="en-GB" sz="2000" dirty="0">
-              <a:latin typeface="Arial"/>
-              <a:cs typeface="Arial"/>
-            </a:endParaRPr>
+            <a:r>
+              <a:rPr lang="en-GB" sz="2000" dirty="0">
+                <a:latin typeface="Arial"/>
+                <a:cs typeface="Arial"/>
+              </a:rPr>
+              <a:t>The syntax is similar to `if`, `</a:t>
+            </a:r>
+            <a:r>
+              <a:rPr lang="en-GB" sz="2000" dirty="0" err="1">
+                <a:latin typeface="Arial"/>
+                <a:cs typeface="Arial"/>
+              </a:rPr>
+              <a:t>elif</a:t>
+            </a:r>
+            <a:r>
+              <a:rPr lang="en-GB" sz="2000" dirty="0">
+                <a:latin typeface="Arial"/>
+                <a:cs typeface="Arial"/>
+              </a:rPr>
+              <a:t>`, and `else`</a:t>
+            </a:r>
           </a:p>
           <a:p>
             <a:pPr marL="342900" indent="-342900">
               <a:buFont typeface="Arial"/>
               <a:buChar char="•"/>
             </a:pPr>
-            <a:endParaRPr lang="en-GB" sz="2000" dirty="0">
-              <a:latin typeface="Arial"/>
-              <a:cs typeface="Arial"/>
-            </a:endParaRPr>
+            <a:r>
+              <a:rPr lang="en-GB" sz="2000" dirty="0">
+                <a:latin typeface="Arial"/>
+                <a:cs typeface="Arial"/>
+              </a:rPr>
+              <a:t>Start with a `while`, then a condition and colon</a:t>
+            </a:r>
           </a:p>
           <a:p>
             <a:pPr marL="342900" indent="-342900">
               <a:buFont typeface="Arial"/>
               <a:buChar char="•"/>
             </a:pPr>
-            <a:endParaRPr lang="en-GB" sz="2000" dirty="0">
-              <a:latin typeface="Arial"/>
-              <a:cs typeface="Arial"/>
-            </a:endParaRPr>
+            <a:r>
+              <a:rPr lang="en-GB" sz="2000" dirty="0">
+                <a:latin typeface="Arial"/>
+                <a:cs typeface="Arial"/>
+              </a:rPr>
+              <a:t>Follow this by indented lines that will be looped whilst the condition is true</a:t>
+            </a:r>
           </a:p>
           <a:p>
             <a:pPr marL="342900" indent="-342900">
               <a:buFont typeface="Arial"/>
               <a:buChar char="•"/>
             </a:pPr>
-            <a:endParaRPr lang="en-GB" sz="2000" dirty="0">
-              <a:latin typeface="Arial"/>
-              <a:cs typeface="Arial"/>
-            </a:endParaRPr>
-          </a:p>
-          <a:p>
-            <a:pPr marL="342900" indent="-342900">
-              <a:buFont typeface="Arial"/>
-              <a:buChar char="•"/>
-            </a:pPr>
-            <a:endParaRPr lang="en-GB" sz="2000" dirty="0">
-              <a:latin typeface="Arial"/>
-              <a:cs typeface="Arial"/>
-            </a:endParaRPr>
-          </a:p>
-          <a:p>
-            <a:pPr marL="342900" indent="-342900">
-              <a:buFont typeface="Arial"/>
-              <a:buChar char="•"/>
-            </a:pPr>
-            <a:endParaRPr lang="en-GB" sz="2000" dirty="0">
-              <a:latin typeface="Arial"/>
-              <a:cs typeface="Arial"/>
-            </a:endParaRPr>
-          </a:p>
-          <a:p>
-            <a:pPr marL="342900" indent="-342900">
-              <a:buFont typeface="Arial"/>
-              <a:buChar char="•"/>
-            </a:pPr>
-            <a:endParaRPr lang="en-GB" sz="2000" dirty="0">
-              <a:latin typeface="Arial"/>
-              <a:cs typeface="Arial"/>
-            </a:endParaRPr>
-          </a:p>
-          <a:p>
-            <a:pPr marL="342900" indent="-342900">
-              <a:buFont typeface="Arial"/>
-              <a:buChar char="•"/>
-            </a:pPr>
             <a:r>
               <a:rPr lang="en-GB" sz="2000" dirty="0">
                 <a:latin typeface="Arial"/>
                 <a:cs typeface="Arial"/>
               </a:rPr>
-              <a:t>Note, if you have a condition in your while loop that never becomes false, you will get stuck in an infinite loop. To escape this, press the stop button next to the code cell</a:t>
+              <a:t>Any lines after the indent will be ran after the loop exits</a:t>
             </a:r>
           </a:p>
         </p:txBody>
       </p:sp>
       <p:pic>
         <p:nvPicPr>
-          <p:cNvPr id="3" name="Picture 2">
+          <p:cNvPr id="5" name="Picture 4">
             <a:extLst>
               <a:ext uri="{FF2B5EF4-FFF2-40B4-BE49-F238E27FC236}">
-                <a16:creationId xmlns:a16="http://schemas.microsoft.com/office/drawing/2014/main" id="{326DEA85-2812-48A2-B44F-05EA0FA6A101}"/>
+                <a16:creationId xmlns:a16="http://schemas.microsoft.com/office/drawing/2014/main" id="{4AF5DC9F-03EF-4FF1-9306-D4ECDCFC6B45}"/>
               </a:ext>
             </a:extLst>
           </p:cNvPr>
@@ -30570,8 +30547,8 @@
         </p:blipFill>
         <p:spPr>
           <a:xfrm>
-            <a:off x="2092892" y="1286781"/>
-            <a:ext cx="4561537" cy="2077057"/>
+            <a:off x="5631828" y="1074586"/>
+            <a:ext cx="3193797" cy="2619722"/>
           </a:xfrm>
           <a:prstGeom prst="rect">
             <a:avLst/>
@@ -30581,7 +30558,7 @@
     </p:spTree>
     <p:extLst>
       <p:ext uri="{BB962C8B-B14F-4D97-AF65-F5344CB8AC3E}">
-        <p14:creationId xmlns:p14="http://schemas.microsoft.com/office/powerpoint/2010/main" val="2026897410"/>
+        <p14:creationId xmlns:p14="http://schemas.microsoft.com/office/powerpoint/2010/main" val="2403563581"/>
       </p:ext>
     </p:extLst>
   </p:cSld>
@@ -30634,7 +30611,7 @@
                 <a:latin typeface="Arial"/>
                 <a:cs typeface="Arial"/>
               </a:rPr>
-              <a:t>While Loops Puzzles</a:t>
+              <a:t>While Loops</a:t>
             </a:r>
             <a:endParaRPr lang="en-GB" dirty="0"/>
           </a:p>
@@ -30871,7 +30848,7 @@
                 <a:latin typeface="Arial"/>
                 <a:cs typeface="Arial"/>
               </a:rPr>
-              <a:t>Use a while loop to count down from 10 to 1 then say “Blast off!” (Hint: create a variable with initial value 10 and decrease it by one at the end of each iteration)</a:t>
+              <a:t>We can use while loops to validate user input</a:t>
             </a:r>
           </a:p>
           <a:p>
@@ -30889,81 +30866,120 @@
               <a:buFont typeface="Arial"/>
               <a:buChar char="•"/>
             </a:pPr>
-            <a:r>
-              <a:rPr lang="en-GB" sz="2000" b="1" dirty="0">
-                <a:latin typeface="Arial"/>
-                <a:cs typeface="Arial"/>
-              </a:rPr>
-              <a:t>Bonus:</a:t>
-            </a:r>
+            <a:endParaRPr lang="en-GB" sz="2000" dirty="0">
+              <a:latin typeface="Arial"/>
+              <a:cs typeface="Arial"/>
+            </a:endParaRPr>
+          </a:p>
+          <a:p>
+            <a:pPr marL="342900" indent="-342900">
+              <a:buFont typeface="Arial"/>
+              <a:buChar char="•"/>
+            </a:pPr>
+            <a:endParaRPr lang="en-GB" sz="2000" dirty="0">
+              <a:latin typeface="Arial"/>
+              <a:cs typeface="Arial"/>
+            </a:endParaRPr>
+          </a:p>
+          <a:p>
+            <a:pPr marL="342900" indent="-342900">
+              <a:buFont typeface="Arial"/>
+              <a:buChar char="•"/>
+            </a:pPr>
+            <a:endParaRPr lang="en-GB" sz="2000" dirty="0">
+              <a:latin typeface="Arial"/>
+              <a:cs typeface="Arial"/>
+            </a:endParaRPr>
+          </a:p>
+          <a:p>
+            <a:pPr marL="342900" indent="-342900">
+              <a:buFont typeface="Arial"/>
+              <a:buChar char="•"/>
+            </a:pPr>
+            <a:endParaRPr lang="en-GB" sz="2000" dirty="0">
+              <a:latin typeface="Arial"/>
+              <a:cs typeface="Arial"/>
+            </a:endParaRPr>
+          </a:p>
+          <a:p>
+            <a:pPr marL="342900" indent="-342900">
+              <a:buFont typeface="Arial"/>
+              <a:buChar char="•"/>
+            </a:pPr>
+            <a:endParaRPr lang="en-GB" sz="2000" dirty="0">
+              <a:latin typeface="Arial"/>
+              <a:cs typeface="Arial"/>
+            </a:endParaRPr>
+          </a:p>
+          <a:p>
+            <a:pPr marL="342900" indent="-342900">
+              <a:buFont typeface="Arial"/>
+              <a:buChar char="•"/>
+            </a:pPr>
+            <a:endParaRPr lang="en-GB" sz="2000" dirty="0">
+              <a:latin typeface="Arial"/>
+              <a:cs typeface="Arial"/>
+            </a:endParaRPr>
+          </a:p>
+          <a:p>
+            <a:pPr marL="342900" indent="-342900">
+              <a:buFont typeface="Arial"/>
+              <a:buChar char="•"/>
+            </a:pPr>
+            <a:endParaRPr lang="en-GB" sz="2000" dirty="0">
+              <a:latin typeface="Arial"/>
+              <a:cs typeface="Arial"/>
+            </a:endParaRPr>
+          </a:p>
+          <a:p>
+            <a:pPr marL="342900" indent="-342900">
+              <a:buFont typeface="Arial"/>
+              <a:buChar char="•"/>
+            </a:pPr>
             <a:r>
               <a:rPr lang="en-GB" sz="2000" dirty="0">
                 <a:latin typeface="Arial"/>
                 <a:cs typeface="Arial"/>
               </a:rPr>
-              <a:t> Have the user decide the original number to count down from</a:t>
-            </a:r>
-          </a:p>
-          <a:p>
-            <a:pPr marL="342900" indent="-342900">
-              <a:buFont typeface="Arial"/>
-              <a:buChar char="•"/>
-            </a:pPr>
-            <a:r>
-              <a:rPr lang="en-GB" sz="2000" b="1" dirty="0">
-                <a:latin typeface="Arial"/>
-                <a:cs typeface="Arial"/>
-              </a:rPr>
-              <a:t>Bonus:</a:t>
-            </a:r>
-            <a:r>
-              <a:rPr lang="en-GB" sz="2000" dirty="0">
-                <a:latin typeface="Arial"/>
-                <a:cs typeface="Arial"/>
-              </a:rPr>
-              <a:t> Search the web for ‘Python assignment operators’ and use these to make your code a bit cleaner</a:t>
-            </a:r>
-          </a:p>
-          <a:p>
-            <a:pPr marL="342900" indent="-342900">
-              <a:buFont typeface="Arial"/>
-              <a:buChar char="•"/>
-            </a:pPr>
-            <a:endParaRPr lang="en-GB" sz="2000" b="1" dirty="0">
-              <a:latin typeface="Arial"/>
-              <a:cs typeface="Arial"/>
-            </a:endParaRPr>
-          </a:p>
-          <a:p>
-            <a:pPr marL="342900" indent="-342900">
-              <a:buFont typeface="Arial"/>
-              <a:buChar char="•"/>
-            </a:pPr>
-            <a:r>
-              <a:rPr lang="en-GB" sz="2000" b="1" dirty="0">
-                <a:latin typeface="Arial"/>
-                <a:cs typeface="Arial"/>
-              </a:rPr>
-              <a:t>Super Bonus:</a:t>
-            </a:r>
-            <a:r>
-              <a:rPr lang="en-GB" sz="2000" dirty="0">
-                <a:latin typeface="Arial"/>
-                <a:cs typeface="Arial"/>
-              </a:rPr>
-              <a:t> Use an `if` statement within the while loop to only print out even numbers (Hint: you can get the remainder of x divided by y using `x % y`. This will be zero if and only if y divides x)</a:t>
-            </a:r>
-            <a:endParaRPr lang="en-GB" sz="2000" b="1" dirty="0">
-              <a:latin typeface="Arial"/>
-              <a:cs typeface="Arial"/>
-            </a:endParaRPr>
-          </a:p>
-        </p:txBody>
-      </p:sp>
+              <a:t>Note, if you have a condition in your while loop that never becomes false, you will get stuck in an infinite loop. To escape this, press the stop button next to the code cell</a:t>
+            </a:r>
+          </a:p>
+        </p:txBody>
+      </p:sp>
+      <p:pic>
+        <p:nvPicPr>
+          <p:cNvPr id="3" name="Picture 2">
+            <a:extLst>
+              <a:ext uri="{FF2B5EF4-FFF2-40B4-BE49-F238E27FC236}">
+                <a16:creationId xmlns:a16="http://schemas.microsoft.com/office/drawing/2014/main" id="{326DEA85-2812-48A2-B44F-05EA0FA6A101}"/>
+              </a:ext>
+            </a:extLst>
+          </p:cNvPr>
+          <p:cNvPicPr>
+            <a:picLocks noChangeAspect="1"/>
+          </p:cNvPicPr>
+          <p:nvPr/>
+        </p:nvPicPr>
+        <p:blipFill>
+          <a:blip r:embed="rId3"/>
+          <a:stretch>
+            <a:fillRect/>
+          </a:stretch>
+        </p:blipFill>
+        <p:spPr>
+          <a:xfrm>
+            <a:off x="2092892" y="1286781"/>
+            <a:ext cx="4561537" cy="2077057"/>
+          </a:xfrm>
+          <a:prstGeom prst="rect">
+            <a:avLst/>
+          </a:prstGeom>
+        </p:spPr>
+      </p:pic>
     </p:spTree>
     <p:extLst>
       <p:ext uri="{BB962C8B-B14F-4D97-AF65-F5344CB8AC3E}">
-        <p14:creationId xmlns:p14="http://schemas.microsoft.com/office/powerpoint/2010/main" val="877927161"/>
+        <p14:creationId xmlns:p14="http://schemas.microsoft.com/office/powerpoint/2010/main" val="2026897410"/>
       </p:ext>
     </p:extLst>
   </p:cSld>
@@ -30995,7 +31011,7 @@
           <p:cNvPr id="2" name="Title 1">
             <a:extLst>
               <a:ext uri="{FF2B5EF4-FFF2-40B4-BE49-F238E27FC236}">
-                <a16:creationId xmlns:a16="http://schemas.microsoft.com/office/drawing/2014/main" id="{5078730F-C1DB-41C6-BF32-17DF9E83CD03}"/>
+                <a16:creationId xmlns:a16="http://schemas.microsoft.com/office/drawing/2014/main" id="{6FF1181F-0C76-47D0-83D2-2133FE38FB6F}"/>
               </a:ext>
             </a:extLst>
           </p:cNvPr>
@@ -31008,13 +31024,17 @@
         </p:nvSpPr>
         <p:spPr/>
         <p:txBody>
-          <a:bodyPr/>
+          <a:bodyPr vert="horz" anchor="t"/>
           <a:lstStyle/>
           <a:p>
             <a:r>
-              <a:rPr lang="en-GB" dirty="0"/>
-              <a:t>While Loops Puzzles Solutions</a:t>
-            </a:r>
+              <a:rPr lang="en-GB" dirty="0">
+                <a:latin typeface="Arial"/>
+                <a:cs typeface="Arial"/>
+              </a:rPr>
+              <a:t>While Loops Puzzles</a:t>
+            </a:r>
+            <a:endParaRPr lang="en-GB" dirty="0"/>
           </a:p>
         </p:txBody>
       </p:sp>
@@ -31023,7 +31043,7 @@
           <p:cNvPr id="4" name="Slide Number Placeholder 3">
             <a:extLst>
               <a:ext uri="{FF2B5EF4-FFF2-40B4-BE49-F238E27FC236}">
-                <a16:creationId xmlns:a16="http://schemas.microsoft.com/office/drawing/2014/main" id="{0698DB97-C7DA-4F8F-82E4-2D4E5136D711}"/>
+                <a16:creationId xmlns:a16="http://schemas.microsoft.com/office/drawing/2014/main" id="{CCA97D33-0674-4F0A-9450-AA6A3EE0628D}"/>
               </a:ext>
             </a:extLst>
           </p:cNvPr>
@@ -31050,40 +31070,10 @@
       </p:sp>
       <p:pic>
         <p:nvPicPr>
-          <p:cNvPr id="5" name="Picture 4">
+          <p:cNvPr id="7" name="Picture 6">
             <a:extLst>
               <a:ext uri="{FF2B5EF4-FFF2-40B4-BE49-F238E27FC236}">
-                <a16:creationId xmlns:a16="http://schemas.microsoft.com/office/drawing/2014/main" id="{74B501C9-AC82-4BB3-AE64-4BBDC6FC7EFB}"/>
-              </a:ext>
-            </a:extLst>
-          </p:cNvPr>
-          <p:cNvPicPr>
-            <a:picLocks noChangeAspect="1"/>
-          </p:cNvPicPr>
-          <p:nvPr/>
-        </p:nvPicPr>
-        <p:blipFill>
-          <a:blip r:embed="rId2"/>
-          <a:stretch>
-            <a:fillRect/>
-          </a:stretch>
-        </p:blipFill>
-        <p:spPr>
-          <a:xfrm>
-            <a:off x="3186441" y="857672"/>
-            <a:ext cx="2382320" cy="3779409"/>
-          </a:xfrm>
-          <a:prstGeom prst="rect">
-            <a:avLst/>
-          </a:prstGeom>
-        </p:spPr>
-      </p:pic>
-      <p:pic>
-        <p:nvPicPr>
-          <p:cNvPr id="6" name="Picture 5">
-            <a:extLst>
-              <a:ext uri="{FF2B5EF4-FFF2-40B4-BE49-F238E27FC236}">
-                <a16:creationId xmlns:a16="http://schemas.microsoft.com/office/drawing/2014/main" id="{C72F2842-F4E5-4ED1-AEBE-BEBBB010DF38}"/>
+                <a16:creationId xmlns:a16="http://schemas.microsoft.com/office/drawing/2014/main" id="{0A9CCCDE-38BA-407D-B893-4D4CD96670C2}"/>
               </a:ext>
             </a:extLst>
           </p:cNvPr>
@@ -31093,7 +31083,7 @@
           <p:nvPr/>
         </p:nvPicPr>
         <p:blipFill rotWithShape="1">
-          <a:blip r:embed="rId3"/>
+          <a:blip r:embed="rId2"/>
           <a:srcRect l="2982" t="3174" r="2869" b="2900"/>
           <a:stretch/>
         </p:blipFill>
@@ -31107,10 +31097,271 @@
           </a:prstGeom>
         </p:spPr>
       </p:pic>
+      <p:sp>
+        <p:nvSpPr>
+          <p:cNvPr id="8" name="Text Placeholder 2">
+            <a:extLst>
+              <a:ext uri="{FF2B5EF4-FFF2-40B4-BE49-F238E27FC236}">
+                <a16:creationId xmlns:a16="http://schemas.microsoft.com/office/drawing/2014/main" id="{AE730BAD-D4CD-4024-84D5-18B8C4B4ED90}"/>
+              </a:ext>
+            </a:extLst>
+          </p:cNvPr>
+          <p:cNvSpPr txBox="1">
+            <a:spLocks/>
+          </p:cNvSpPr>
+          <p:nvPr/>
+        </p:nvSpPr>
+        <p:spPr>
+          <a:xfrm>
+            <a:off x="237061" y="712956"/>
+            <a:ext cx="8533170" cy="3885327"/>
+          </a:xfrm>
+          <a:prstGeom prst="rect">
+            <a:avLst/>
+          </a:prstGeom>
+        </p:spPr>
+        <p:txBody>
+          <a:bodyPr vert="horz" anchor="t"/>
+          <a:lstStyle>
+            <a:lvl1pPr marL="0" indent="0" algn="l" defTabSz="457200" rtl="0" eaLnBrk="1" latinLnBrk="0" hangingPunct="1">
+              <a:spcBef>
+                <a:spcPts val="0"/>
+              </a:spcBef>
+              <a:buFont typeface="Arial"/>
+              <a:buNone/>
+              <a:defRPr sz="2400" kern="1200" baseline="0">
+                <a:solidFill>
+                  <a:schemeClr val="tx1"/>
+                </a:solidFill>
+                <a:latin typeface="Arial" pitchFamily="34" charset="0"/>
+                <a:ea typeface="+mn-ea"/>
+                <a:cs typeface="Arial" pitchFamily="34" charset="0"/>
+              </a:defRPr>
+            </a:lvl1pPr>
+            <a:lvl2pPr marL="457200" indent="0" algn="l" defTabSz="457200" rtl="0" eaLnBrk="1" latinLnBrk="0" hangingPunct="1">
+              <a:spcBef>
+                <a:spcPct val="20000"/>
+              </a:spcBef>
+              <a:buFont typeface="Arial"/>
+              <a:buNone/>
+              <a:defRPr sz="2400" kern="1200">
+                <a:solidFill>
+                  <a:schemeClr val="tx1"/>
+                </a:solidFill>
+                <a:latin typeface="+mn-lt"/>
+                <a:ea typeface="+mn-ea"/>
+                <a:cs typeface="+mn-cs"/>
+              </a:defRPr>
+            </a:lvl2pPr>
+            <a:lvl3pPr marL="914400" indent="0" algn="l" defTabSz="457200" rtl="0" eaLnBrk="1" latinLnBrk="0" hangingPunct="1">
+              <a:spcBef>
+                <a:spcPct val="20000"/>
+              </a:spcBef>
+              <a:buFont typeface="Arial"/>
+              <a:buNone/>
+              <a:defRPr sz="2400" kern="1200">
+                <a:solidFill>
+                  <a:schemeClr val="tx1"/>
+                </a:solidFill>
+                <a:latin typeface="+mn-lt"/>
+                <a:ea typeface="+mn-ea"/>
+                <a:cs typeface="+mn-cs"/>
+              </a:defRPr>
+            </a:lvl3pPr>
+            <a:lvl4pPr marL="1371600" indent="0" algn="l" defTabSz="457200" rtl="0" eaLnBrk="1" latinLnBrk="0" hangingPunct="1">
+              <a:spcBef>
+                <a:spcPct val="20000"/>
+              </a:spcBef>
+              <a:buFont typeface="Arial"/>
+              <a:buNone/>
+              <a:defRPr sz="2400" kern="1200">
+                <a:solidFill>
+                  <a:schemeClr val="tx1"/>
+                </a:solidFill>
+                <a:latin typeface="+mn-lt"/>
+                <a:ea typeface="+mn-ea"/>
+                <a:cs typeface="+mn-cs"/>
+              </a:defRPr>
+            </a:lvl4pPr>
+            <a:lvl5pPr marL="1828800" indent="0" algn="l" defTabSz="457200" rtl="0" eaLnBrk="1" latinLnBrk="0" hangingPunct="1">
+              <a:spcBef>
+                <a:spcPct val="20000"/>
+              </a:spcBef>
+              <a:buFont typeface="Arial"/>
+              <a:buNone/>
+              <a:defRPr sz="2400" kern="1200">
+                <a:solidFill>
+                  <a:schemeClr val="tx1"/>
+                </a:solidFill>
+                <a:latin typeface="+mn-lt"/>
+                <a:ea typeface="+mn-ea"/>
+                <a:cs typeface="+mn-cs"/>
+              </a:defRPr>
+            </a:lvl5pPr>
+            <a:lvl6pPr marL="2514600" indent="-228600" algn="l" defTabSz="457200" rtl="0" eaLnBrk="1" latinLnBrk="0" hangingPunct="1">
+              <a:spcBef>
+                <a:spcPct val="20000"/>
+              </a:spcBef>
+              <a:buFont typeface="Arial"/>
+              <a:buChar char="•"/>
+              <a:defRPr sz="2000" kern="1200">
+                <a:solidFill>
+                  <a:schemeClr val="tx1"/>
+                </a:solidFill>
+                <a:latin typeface="+mn-lt"/>
+                <a:ea typeface="+mn-ea"/>
+                <a:cs typeface="+mn-cs"/>
+              </a:defRPr>
+            </a:lvl6pPr>
+            <a:lvl7pPr marL="2971800" indent="-228600" algn="l" defTabSz="457200" rtl="0" eaLnBrk="1" latinLnBrk="0" hangingPunct="1">
+              <a:spcBef>
+                <a:spcPct val="20000"/>
+              </a:spcBef>
+              <a:buFont typeface="Arial"/>
+              <a:buChar char="•"/>
+              <a:defRPr sz="2000" kern="1200">
+                <a:solidFill>
+                  <a:schemeClr val="tx1"/>
+                </a:solidFill>
+                <a:latin typeface="+mn-lt"/>
+                <a:ea typeface="+mn-ea"/>
+                <a:cs typeface="+mn-cs"/>
+              </a:defRPr>
+            </a:lvl7pPr>
+            <a:lvl8pPr marL="3429000" indent="-228600" algn="l" defTabSz="457200" rtl="0" eaLnBrk="1" latinLnBrk="0" hangingPunct="1">
+              <a:spcBef>
+                <a:spcPct val="20000"/>
+              </a:spcBef>
+              <a:buFont typeface="Arial"/>
+              <a:buChar char="•"/>
+              <a:defRPr sz="2000" kern="1200">
+                <a:solidFill>
+                  <a:schemeClr val="tx1"/>
+                </a:solidFill>
+                <a:latin typeface="+mn-lt"/>
+                <a:ea typeface="+mn-ea"/>
+                <a:cs typeface="+mn-cs"/>
+              </a:defRPr>
+            </a:lvl8pPr>
+            <a:lvl9pPr marL="3886200" indent="-228600" algn="l" defTabSz="457200" rtl="0" eaLnBrk="1" latinLnBrk="0" hangingPunct="1">
+              <a:spcBef>
+                <a:spcPct val="20000"/>
+              </a:spcBef>
+              <a:buFont typeface="Arial"/>
+              <a:buChar char="•"/>
+              <a:defRPr sz="2000" kern="1200">
+                <a:solidFill>
+                  <a:schemeClr val="tx1"/>
+                </a:solidFill>
+                <a:latin typeface="+mn-lt"/>
+                <a:ea typeface="+mn-ea"/>
+                <a:cs typeface="+mn-cs"/>
+              </a:defRPr>
+            </a:lvl9pPr>
+          </a:lstStyle>
+          <a:p>
+            <a:pPr marL="342900" indent="-342900">
+              <a:buFont typeface="Arial"/>
+              <a:buChar char="•"/>
+            </a:pPr>
+            <a:r>
+              <a:rPr lang="en-GB" sz="2000" dirty="0">
+                <a:latin typeface="Arial"/>
+                <a:cs typeface="Arial"/>
+              </a:rPr>
+              <a:t>Use a while loop to count down from 10 to 1 then say “Blast off!” (Hint: create a variable with initial value 10 and decrease it by one at the end of each iteration)</a:t>
+            </a:r>
+          </a:p>
+          <a:p>
+            <a:pPr marL="342900" indent="-342900">
+              <a:buFont typeface="Arial"/>
+              <a:buChar char="•"/>
+            </a:pPr>
+            <a:endParaRPr lang="en-GB" sz="2000" dirty="0">
+              <a:latin typeface="Arial"/>
+              <a:cs typeface="Arial"/>
+            </a:endParaRPr>
+          </a:p>
+          <a:p>
+            <a:pPr marL="342900" indent="-342900">
+              <a:buFont typeface="Arial"/>
+              <a:buChar char="•"/>
+            </a:pPr>
+            <a:r>
+              <a:rPr lang="en-GB" sz="2000" b="1" dirty="0">
+                <a:latin typeface="Arial"/>
+                <a:cs typeface="Arial"/>
+              </a:rPr>
+              <a:t>Bonus:</a:t>
+            </a:r>
+            <a:r>
+              <a:rPr lang="en-GB" sz="2000" dirty="0">
+                <a:latin typeface="Arial"/>
+                <a:cs typeface="Arial"/>
+              </a:rPr>
+              <a:t> Have the user decide the original number to count down from</a:t>
+            </a:r>
+          </a:p>
+          <a:p>
+            <a:pPr marL="342900" indent="-342900">
+              <a:buFont typeface="Arial"/>
+              <a:buChar char="•"/>
+            </a:pPr>
+            <a:r>
+              <a:rPr lang="en-GB" sz="2000" b="1" dirty="0">
+                <a:latin typeface="Arial"/>
+                <a:cs typeface="Arial"/>
+              </a:rPr>
+              <a:t>Bonus:</a:t>
+            </a:r>
+            <a:r>
+              <a:rPr lang="en-GB" sz="2000" dirty="0">
+                <a:latin typeface="Arial"/>
+                <a:cs typeface="Arial"/>
+              </a:rPr>
+              <a:t> Search the web for ‘Python assignment operators’ and use these to make your code a bit cleaner</a:t>
+            </a:r>
+          </a:p>
+          <a:p>
+            <a:pPr marL="342900" indent="-342900">
+              <a:buFont typeface="Arial"/>
+              <a:buChar char="•"/>
+            </a:pPr>
+            <a:endParaRPr lang="en-GB" sz="2000" b="1" dirty="0">
+              <a:latin typeface="Arial"/>
+              <a:cs typeface="Arial"/>
+            </a:endParaRPr>
+          </a:p>
+          <a:p>
+            <a:pPr marL="342900" indent="-342900">
+              <a:buFont typeface="Arial"/>
+              <a:buChar char="•"/>
+            </a:pPr>
+            <a:r>
+              <a:rPr lang="en-GB" sz="2000" b="1" dirty="0">
+                <a:latin typeface="Arial"/>
+                <a:cs typeface="Arial"/>
+              </a:rPr>
+              <a:t>Super Bonus:</a:t>
+            </a:r>
+            <a:r>
+              <a:rPr lang="en-GB" sz="2000" dirty="0">
+                <a:latin typeface="Arial"/>
+                <a:cs typeface="Arial"/>
+              </a:rPr>
+              <a:t> Use an `if` statement within the while loop to only print out even numbers (Hint: you can get the remainder of x divided by y using `x % y`. This will be zero if and only if y divides x)</a:t>
+            </a:r>
+            <a:endParaRPr lang="en-GB" sz="2000" b="1" dirty="0">
+              <a:latin typeface="Arial"/>
+              <a:cs typeface="Arial"/>
+            </a:endParaRPr>
+          </a:p>
+        </p:txBody>
+      </p:sp>
     </p:spTree>
     <p:extLst>
       <p:ext uri="{BB962C8B-B14F-4D97-AF65-F5344CB8AC3E}">
-        <p14:creationId xmlns:p14="http://schemas.microsoft.com/office/powerpoint/2010/main" val="991010492"/>
+        <p14:creationId xmlns:p14="http://schemas.microsoft.com/office/powerpoint/2010/main" val="877927161"/>
       </p:ext>
     </p:extLst>
   </p:cSld>
@@ -31475,6 +31726,153 @@
     <p:extLst>
       <p:ext uri="{BB962C8B-B14F-4D97-AF65-F5344CB8AC3E}">
         <p14:creationId xmlns:p14="http://schemas.microsoft.com/office/powerpoint/2010/main" val="2863176854"/>
+      </p:ext>
+    </p:extLst>
+  </p:cSld>
+  <p:clrMapOvr>
+    <a:masterClrMapping/>
+  </p:clrMapOvr>
+</p:sld>
+</file>
+
+<file path=ppt/slides/slide20.xml><?xml version="1.0" encoding="utf-8"?>
+<p:sld xmlns:a="http://schemas.openxmlformats.org/drawingml/2006/main" xmlns:r="http://schemas.openxmlformats.org/officeDocument/2006/relationships" xmlns:p="http://schemas.openxmlformats.org/presentationml/2006/main" showMasterSp="0">
+  <p:cSld>
+    <p:spTree>
+      <p:nvGrpSpPr>
+        <p:cNvPr id="1" name=""/>
+        <p:cNvGrpSpPr/>
+        <p:nvPr/>
+      </p:nvGrpSpPr>
+      <p:grpSpPr>
+        <a:xfrm>
+          <a:off x="0" y="0"/>
+          <a:ext cx="0" cy="0"/>
+          <a:chOff x="0" y="0"/>
+          <a:chExt cx="0" cy="0"/>
+        </a:xfrm>
+      </p:grpSpPr>
+      <p:sp>
+        <p:nvSpPr>
+          <p:cNvPr id="2" name="Title 1">
+            <a:extLst>
+              <a:ext uri="{FF2B5EF4-FFF2-40B4-BE49-F238E27FC236}">
+                <a16:creationId xmlns:a16="http://schemas.microsoft.com/office/drawing/2014/main" id="{5078730F-C1DB-41C6-BF32-17DF9E83CD03}"/>
+              </a:ext>
+            </a:extLst>
+          </p:cNvPr>
+          <p:cNvSpPr>
+            <a:spLocks noGrp="1"/>
+          </p:cNvSpPr>
+          <p:nvPr>
+            <p:ph type="title"/>
+          </p:nvPr>
+        </p:nvSpPr>
+        <p:spPr/>
+        <p:txBody>
+          <a:bodyPr/>
+          <a:lstStyle/>
+          <a:p>
+            <a:r>
+              <a:rPr lang="en-GB" dirty="0"/>
+              <a:t>While Loops Puzzles Solutions</a:t>
+            </a:r>
+          </a:p>
+        </p:txBody>
+      </p:sp>
+      <p:sp>
+        <p:nvSpPr>
+          <p:cNvPr id="4" name="Slide Number Placeholder 3">
+            <a:extLst>
+              <a:ext uri="{FF2B5EF4-FFF2-40B4-BE49-F238E27FC236}">
+                <a16:creationId xmlns:a16="http://schemas.microsoft.com/office/drawing/2014/main" id="{0698DB97-C7DA-4F8F-82E4-2D4E5136D711}"/>
+              </a:ext>
+            </a:extLst>
+          </p:cNvPr>
+          <p:cNvSpPr>
+            <a:spLocks noGrp="1"/>
+          </p:cNvSpPr>
+          <p:nvPr>
+            <p:ph type="sldNum" sz="quarter" idx="4"/>
+          </p:nvPr>
+        </p:nvSpPr>
+        <p:spPr/>
+        <p:txBody>
+          <a:bodyPr/>
+          <a:lstStyle/>
+          <a:p>
+            <a:fld id="{3C4F54F3-C349-4609-AFEE-01462D5C7942}" type="slidenum">
+              <a:rPr lang="en-GB" smtClean="0"/>
+              <a:pPr/>
+              <a:t>20</a:t>
+            </a:fld>
+            <a:endParaRPr lang="en-GB"/>
+          </a:p>
+        </p:txBody>
+      </p:sp>
+      <p:pic>
+        <p:nvPicPr>
+          <p:cNvPr id="5" name="Picture 4">
+            <a:extLst>
+              <a:ext uri="{FF2B5EF4-FFF2-40B4-BE49-F238E27FC236}">
+                <a16:creationId xmlns:a16="http://schemas.microsoft.com/office/drawing/2014/main" id="{74B501C9-AC82-4BB3-AE64-4BBDC6FC7EFB}"/>
+              </a:ext>
+            </a:extLst>
+          </p:cNvPr>
+          <p:cNvPicPr>
+            <a:picLocks noChangeAspect="1"/>
+          </p:cNvPicPr>
+          <p:nvPr/>
+        </p:nvPicPr>
+        <p:blipFill>
+          <a:blip r:embed="rId2"/>
+          <a:stretch>
+            <a:fillRect/>
+          </a:stretch>
+        </p:blipFill>
+        <p:spPr>
+          <a:xfrm>
+            <a:off x="3186441" y="857672"/>
+            <a:ext cx="2382320" cy="3779409"/>
+          </a:xfrm>
+          <a:prstGeom prst="rect">
+            <a:avLst/>
+          </a:prstGeom>
+        </p:spPr>
+      </p:pic>
+      <p:pic>
+        <p:nvPicPr>
+          <p:cNvPr id="6" name="Picture 5">
+            <a:extLst>
+              <a:ext uri="{FF2B5EF4-FFF2-40B4-BE49-F238E27FC236}">
+                <a16:creationId xmlns:a16="http://schemas.microsoft.com/office/drawing/2014/main" id="{C72F2842-F4E5-4ED1-AEBE-BEBBB010DF38}"/>
+              </a:ext>
+            </a:extLst>
+          </p:cNvPr>
+          <p:cNvPicPr>
+            <a:picLocks noChangeAspect="1"/>
+          </p:cNvPicPr>
+          <p:nvPr/>
+        </p:nvPicPr>
+        <p:blipFill rotWithShape="1">
+          <a:blip r:embed="rId3"/>
+          <a:srcRect l="2982" t="3174" r="2869" b="2900"/>
+          <a:stretch/>
+        </p:blipFill>
+        <p:spPr>
+          <a:xfrm>
+            <a:off x="8576572" y="4598283"/>
+            <a:ext cx="498106" cy="496941"/>
+          </a:xfrm>
+          <a:prstGeom prst="ellipse">
+            <a:avLst/>
+          </a:prstGeom>
+        </p:spPr>
+      </p:pic>
+    </p:spTree>
+    <p:extLst>
+      <p:ext uri="{BB962C8B-B14F-4D97-AF65-F5344CB8AC3E}">
+        <p14:creationId xmlns:p14="http://schemas.microsoft.com/office/powerpoint/2010/main" val="991010492"/>
       </p:ext>
     </p:extLst>
   </p:cSld>
@@ -36788,6 +37186,11 @@
 </file>
 
 <file path=customXml/item1.xml><?xml version="1.0" encoding="utf-8"?>
+<?mso-contentType ?>
+<SharedContentType xmlns="Microsoft.SharePoint.Taxonomy.ContentTypeSync" SourceId="1ee89e71-04cd-405e-9ca3-99e020c1694d" ContentTypeId="0x0101" PreviousValue="false"/>
+</file>
+
+<file path=customXml/item2.xml><?xml version="1.0" encoding="utf-8"?>
 <ct:contentTypeSchema xmlns:ct="http://schemas.microsoft.com/office/2006/metadata/contentType" xmlns:ma="http://schemas.microsoft.com/office/2006/metadata/properties/metaAttributes" ct:_="" ma:_="" ma:contentTypeName="Document" ma:contentTypeID="0x010100C9F3DD611966374C9EAA8DC5A2F94CD8" ma:contentTypeVersion="8" ma:contentTypeDescription="Create a new document." ma:contentTypeScope="" ma:versionID="18a8759320524e51783f13c6663a10d1">
   <xsd:schema xmlns:xsd="http://www.w3.org/2001/XMLSchema" xmlns:xs="http://www.w3.org/2001/XMLSchema" xmlns:p="http://schemas.microsoft.com/office/2006/metadata/properties" xmlns:ns2="44a56295-c29e-4898-8136-a54736c65b82" xmlns:ns3="9675ef8f-b755-4cd6-a742-8cae3d86c4fe" targetNamespace="http://schemas.microsoft.com/office/2006/metadata/properties" ma:root="true" ma:fieldsID="1b693415669a5bc10d56a9234ce5202b" ns2:_="" ns3:_="">
     <xsd:import namespace="44a56295-c29e-4898-8136-a54736c65b82"/>
@@ -36966,12 +37369,16 @@
 </ct:contentTypeSchema>
 </file>
 
-<file path=customXml/item2.xml><?xml version="1.0" encoding="utf-8"?>
+<file path=customXml/item3.xml><?xml version="1.0" encoding="utf-8"?>
 <?mso-contentType ?>
-<SharedContentType xmlns="Microsoft.SharePoint.Taxonomy.ContentTypeSync" SourceId="1ee89e71-04cd-405e-9ca3-99e020c1694d" ContentTypeId="0x0101" PreviousValue="false"/>
+<FormTemplates xmlns="http://schemas.microsoft.com/sharepoint/v3/contenttype/forms">
+  <Display>DocumentLibraryForm</Display>
+  <Edit>DocumentLibraryForm</Edit>
+  <New>DocumentLibraryForm</New>
+</FormTemplates>
 </file>
 
-<file path=customXml/item3.xml><?xml version="1.0" encoding="utf-8"?>
+<file path=customXml/item4.xml><?xml version="1.0" encoding="utf-8"?>
 <p:properties xmlns:p="http://schemas.microsoft.com/office/2006/metadata/properties" xmlns:xsi="http://www.w3.org/2001/XMLSchema-instance" xmlns:pc="http://schemas.microsoft.com/office/infopath/2007/PartnerControls">
   <documentManagement>
     <Keyword xmlns="44a56295-c29e-4898-8136-a54736c65b82" xsi:nil="true"/>
@@ -36980,16 +37387,15 @@
 </p:properties>
 </file>
 
-<file path=customXml/item4.xml><?xml version="1.0" encoding="utf-8"?>
-<?mso-contentType ?>
-<FormTemplates xmlns="http://schemas.microsoft.com/sharepoint/v3/contenttype/forms">
-  <Display>DocumentLibraryForm</Display>
-  <Edit>DocumentLibraryForm</Edit>
-  <New>DocumentLibraryForm</New>
-</FormTemplates>
+<file path=customXml/itemProps1.xml><?xml version="1.0" encoding="utf-8"?>
+<ds:datastoreItem xmlns:ds="http://schemas.openxmlformats.org/officeDocument/2006/customXml" ds:itemID="{91989A13-6EBC-4BFF-A25C-E4D3CAAA08AF}">
+  <ds:schemaRefs>
+    <ds:schemaRef ds:uri="Microsoft.SharePoint.Taxonomy.ContentTypeSync"/>
+  </ds:schemaRefs>
+</ds:datastoreItem>
 </file>
 
-<file path=customXml/itemProps1.xml><?xml version="1.0" encoding="utf-8"?>
+<file path=customXml/itemProps2.xml><?xml version="1.0" encoding="utf-8"?>
 <ds:datastoreItem xmlns:ds="http://schemas.openxmlformats.org/officeDocument/2006/customXml" ds:itemID="{68ED3CC4-90A9-4466-8611-49F71BEF9534}">
   <ds:schemaRefs>
     <ds:schemaRef ds:uri="44a56295-c29e-4898-8136-a54736c65b82"/>
@@ -37008,15 +37414,15 @@
 </ds:datastoreItem>
 </file>
 
-<file path=customXml/itemProps2.xml><?xml version="1.0" encoding="utf-8"?>
-<ds:datastoreItem xmlns:ds="http://schemas.openxmlformats.org/officeDocument/2006/customXml" ds:itemID="{91989A13-6EBC-4BFF-A25C-E4D3CAAA08AF}">
+<file path=customXml/itemProps3.xml><?xml version="1.0" encoding="utf-8"?>
+<ds:datastoreItem xmlns:ds="http://schemas.openxmlformats.org/officeDocument/2006/customXml" ds:itemID="{BEBDFA33-3959-412D-BF65-F572B77FF4EC}">
   <ds:schemaRefs>
-    <ds:schemaRef ds:uri="Microsoft.SharePoint.Taxonomy.ContentTypeSync"/>
+    <ds:schemaRef ds:uri="http://schemas.microsoft.com/sharepoint/v3/contenttype/forms"/>
   </ds:schemaRefs>
 </ds:datastoreItem>
 </file>
 
-<file path=customXml/itemProps3.xml><?xml version="1.0" encoding="utf-8"?>
+<file path=customXml/itemProps4.xml><?xml version="1.0" encoding="utf-8"?>
 <ds:datastoreItem xmlns:ds="http://schemas.openxmlformats.org/officeDocument/2006/customXml" ds:itemID="{9F6F5FD0-A94F-4E0E-8953-A634089166A9}">
   <ds:schemaRefs>
     <ds:schemaRef ds:uri="44a56295-c29e-4898-8136-a54736c65b82"/>
@@ -37031,12 +37437,4 @@
     <ds:schemaRef ds:uri="http://www.w3.org/XML/1998/namespace"/>
   </ds:schemaRefs>
 </ds:datastoreItem>
-</file>
-
-<file path=customXml/itemProps4.xml><?xml version="1.0" encoding="utf-8"?>
-<ds:datastoreItem xmlns:ds="http://schemas.openxmlformats.org/officeDocument/2006/customXml" ds:itemID="{BEBDFA33-3959-412D-BF65-F572B77FF4EC}">
-  <ds:schemaRefs>
-    <ds:schemaRef ds:uri="http://schemas.microsoft.com/sharepoint/v3/contenttype/forms"/>
-  </ds:schemaRefs>
-</ds:datastoreItem>
 </file>
</xml_diff>

<commit_message>
Make correction to control flow puzzles solutions
</commit_message>
<xml_diff>
--- a/session_three/session_three_presentation.pptx
+++ b/session_three/session_three_presentation.pptx
@@ -29894,18 +29894,11 @@
               <a:buChar char="•"/>
             </a:pPr>
             <a:r>
-              <a:rPr lang="en-GB" sz="2000">
-                <a:latin typeface="Arial"/>
-                <a:cs typeface="Arial"/>
-              </a:rPr>
-              <a:t>Ask </a:t>
-            </a:r>
-            <a:r>
               <a:rPr lang="en-GB" sz="2000" dirty="0">
                 <a:latin typeface="Arial"/>
                 <a:cs typeface="Arial"/>
               </a:rPr>
-              <a:t>the user to guess the number and print whether they were too low, too high, or bang on</a:t>
+              <a:t>Ask the user to guess the number and print whether they were too low, too high, or bang on</a:t>
             </a:r>
           </a:p>
           <a:p>
@@ -30097,10 +30090,10 @@
       </p:pic>
       <p:pic>
         <p:nvPicPr>
-          <p:cNvPr id="3" name="Picture 2">
+          <p:cNvPr id="6" name="Picture 5">
             <a:extLst>
               <a:ext uri="{FF2B5EF4-FFF2-40B4-BE49-F238E27FC236}">
-                <a16:creationId xmlns:a16="http://schemas.microsoft.com/office/drawing/2014/main" id="{EC5268D5-4856-4BA4-A1B3-476A774A395A}"/>
+                <a16:creationId xmlns:a16="http://schemas.microsoft.com/office/drawing/2014/main" id="{E70EEBB8-8FBF-415A-820E-D663FDD8B5D5}"/>
               </a:ext>
             </a:extLst>
           </p:cNvPr>
@@ -30117,8 +30110,8 @@
         </p:blipFill>
         <p:spPr>
           <a:xfrm>
-            <a:off x="509700" y="1144199"/>
-            <a:ext cx="3619715" cy="2855101"/>
+            <a:off x="4670423" y="1368263"/>
+            <a:ext cx="3963877" cy="2261672"/>
           </a:xfrm>
           <a:prstGeom prst="rect">
             <a:avLst/>
@@ -30127,10 +30120,10 @@
       </p:pic>
       <p:pic>
         <p:nvPicPr>
-          <p:cNvPr id="6" name="Picture 5">
+          <p:cNvPr id="5" name="Picture 4">
             <a:extLst>
               <a:ext uri="{FF2B5EF4-FFF2-40B4-BE49-F238E27FC236}">
-                <a16:creationId xmlns:a16="http://schemas.microsoft.com/office/drawing/2014/main" id="{E70EEBB8-8FBF-415A-820E-D663FDD8B5D5}"/>
+                <a16:creationId xmlns:a16="http://schemas.microsoft.com/office/drawing/2014/main" id="{B497B55E-2C81-47BF-B2A7-70410FFD633D}"/>
               </a:ext>
             </a:extLst>
           </p:cNvPr>
@@ -30147,8 +30140,8 @@
         </p:blipFill>
         <p:spPr>
           <a:xfrm>
-            <a:off x="4670423" y="1368263"/>
-            <a:ext cx="3963877" cy="2261672"/>
+            <a:off x="509700" y="1137654"/>
+            <a:ext cx="3691239" cy="2868192"/>
           </a:xfrm>
           <a:prstGeom prst="rect">
             <a:avLst/>

</xml_diff>

<commit_message>
Add session three exercises and solutions
</commit_message>
<xml_diff>
--- a/session_three/session_three_presentation.pptx
+++ b/session_three/session_three_presentation.pptx
@@ -188,9 +188,6 @@
     <pc:chgData name="Bradley, Sam" userId="S::kwgk592@astrazeneca.net::f75c196c-0419-4ed7-9101-2e14ae32ff77" providerId="AD" clId="Web-{0224862F-D625-4ACA-AA88-F501D6113382}"/>
   </pc:docChgLst>
   <pc:docChgLst>
-    <pc:chgData name="Whittaker, Ryan" userId="S::kbqc931@astrazeneca.net::873b3a98-b8cc-426f-9da0-8dcfa40dc643" providerId="AD" clId="Web-{3CD0F431-51DF-40C2-BD51-649D9270BCA3}"/>
-  </pc:docChgLst>
-  <pc:docChgLst>
     <pc:chgData name="McKinney, David" userId="8b945cb3-78ce-42d7-adc5-b07bab32cd5b" providerId="ADAL" clId="{27DA46D1-4CFF-4F57-B893-F188B7B63A2A}"/>
     <pc:docChg chg="custSel modSld">
       <pc:chgData name="McKinney, David" userId="8b945cb3-78ce-42d7-adc5-b07bab32cd5b" providerId="ADAL" clId="{27DA46D1-4CFF-4F57-B893-F188B7B63A2A}" dt="2020-02-28T16:34:28.363" v="152" actId="1076"/>
@@ -244,6 +241,9 @@
         </pc:picChg>
       </pc:sldChg>
     </pc:docChg>
+  </pc:docChgLst>
+  <pc:docChgLst>
+    <pc:chgData name="Whittaker, Ryan" userId="S::kbqc931@astrazeneca.net::873b3a98-b8cc-426f-9da0-8dcfa40dc643" providerId="AD" clId="Web-{3CD0F431-51DF-40C2-BD51-649D9270BCA3}"/>
   </pc:docChgLst>
   <pc:docChgLst>
     <pc:chgData name="McKinney, David" userId="8b945cb3-78ce-42d7-adc5-b07bab32cd5b" providerId="ADAL" clId="{3DD7EA22-7276-4B32-A5EF-ECEBFF479BE2}"/>
@@ -868,7 +868,7 @@
             <a:fld id="{3BBED7E8-0829-F34C-B479-A757805E6C1B}" type="datetimeFigureOut">
               <a:rPr lang="en-US" smtClean="0"/>
               <a:pPr/>
-              <a:t>4/7/2020</a:t>
+              <a:t>4/8/2020</a:t>
             </a:fld>
             <a:endParaRPr lang="en-US"/>
           </a:p>
@@ -1036,7 +1036,7 @@
             <a:fld id="{6C7E4F11-7667-5045-A00B-01970EA44BB5}" type="datetimeFigureOut">
               <a:rPr lang="en-US" smtClean="0"/>
               <a:pPr/>
-              <a:t>4/7/2020</a:t>
+              <a:t>4/8/2020</a:t>
             </a:fld>
             <a:endParaRPr lang="en-US"/>
           </a:p>
@@ -37191,6 +37191,24 @@
 </file>
 
 <file path=customXml/item2.xml><?xml version="1.0" encoding="utf-8"?>
+<p:properties xmlns:p="http://schemas.microsoft.com/office/2006/metadata/properties" xmlns:xsi="http://www.w3.org/2001/XMLSchema-instance" xmlns:pc="http://schemas.microsoft.com/office/infopath/2007/PartnerControls">
+  <documentManagement>
+    <Keyword xmlns="44a56295-c29e-4898-8136-a54736c65b82" xsi:nil="true"/>
+    <Descriptions xmlns="44a56295-c29e-4898-8136-a54736c65b82" xsi:nil="true"/>
+  </documentManagement>
+</p:properties>
+</file>
+
+<file path=customXml/item3.xml><?xml version="1.0" encoding="utf-8"?>
+<?mso-contentType ?>
+<FormTemplates xmlns="http://schemas.microsoft.com/sharepoint/v3/contenttype/forms">
+  <Display>DocumentLibraryForm</Display>
+  <Edit>DocumentLibraryForm</Edit>
+  <New>DocumentLibraryForm</New>
+</FormTemplates>
+</file>
+
+<file path=customXml/item4.xml><?xml version="1.0" encoding="utf-8"?>
 <ct:contentTypeSchema xmlns:ct="http://schemas.microsoft.com/office/2006/metadata/contentType" xmlns:ma="http://schemas.microsoft.com/office/2006/metadata/properties/metaAttributes" ct:_="" ma:_="" ma:contentTypeName="Document" ma:contentTypeID="0x010100C9F3DD611966374C9EAA8DC5A2F94CD8" ma:contentTypeVersion="8" ma:contentTypeDescription="Create a new document." ma:contentTypeScope="" ma:versionID="18a8759320524e51783f13c6663a10d1">
   <xsd:schema xmlns:xsd="http://www.w3.org/2001/XMLSchema" xmlns:xs="http://www.w3.org/2001/XMLSchema" xmlns:p="http://schemas.microsoft.com/office/2006/metadata/properties" xmlns:ns2="44a56295-c29e-4898-8136-a54736c65b82" xmlns:ns3="9675ef8f-b755-4cd6-a742-8cae3d86c4fe" targetNamespace="http://schemas.microsoft.com/office/2006/metadata/properties" ma:root="true" ma:fieldsID="1b693415669a5bc10d56a9234ce5202b" ns2:_="" ns3:_="">
     <xsd:import namespace="44a56295-c29e-4898-8136-a54736c65b82"/>
@@ -37369,24 +37387,6 @@
 </ct:contentTypeSchema>
 </file>
 
-<file path=customXml/item3.xml><?xml version="1.0" encoding="utf-8"?>
-<?mso-contentType ?>
-<FormTemplates xmlns="http://schemas.microsoft.com/sharepoint/v3/contenttype/forms">
-  <Display>DocumentLibraryForm</Display>
-  <Edit>DocumentLibraryForm</Edit>
-  <New>DocumentLibraryForm</New>
-</FormTemplates>
-</file>
-
-<file path=customXml/item4.xml><?xml version="1.0" encoding="utf-8"?>
-<p:properties xmlns:p="http://schemas.microsoft.com/office/2006/metadata/properties" xmlns:xsi="http://www.w3.org/2001/XMLSchema-instance" xmlns:pc="http://schemas.microsoft.com/office/infopath/2007/PartnerControls">
-  <documentManagement>
-    <Keyword xmlns="44a56295-c29e-4898-8136-a54736c65b82" xsi:nil="true"/>
-    <Descriptions xmlns="44a56295-c29e-4898-8136-a54736c65b82" xsi:nil="true"/>
-  </documentManagement>
-</p:properties>
-</file>
-
 <file path=customXml/itemProps1.xml><?xml version="1.0" encoding="utf-8"?>
 <ds:datastoreItem xmlns:ds="http://schemas.openxmlformats.org/officeDocument/2006/customXml" ds:itemID="{91989A13-6EBC-4BFF-A25C-E4D3CAAA08AF}">
   <ds:schemaRefs>
@@ -37396,6 +37396,31 @@
 </file>
 
 <file path=customXml/itemProps2.xml><?xml version="1.0" encoding="utf-8"?>
+<ds:datastoreItem xmlns:ds="http://schemas.openxmlformats.org/officeDocument/2006/customXml" ds:itemID="{9F6F5FD0-A94F-4E0E-8953-A634089166A9}">
+  <ds:schemaRefs>
+    <ds:schemaRef ds:uri="44a56295-c29e-4898-8136-a54736c65b82"/>
+    <ds:schemaRef ds:uri="9675ef8f-b755-4cd6-a742-8cae3d86c4fe"/>
+    <ds:schemaRef ds:uri="http://purl.org/dc/dcmitype/"/>
+    <ds:schemaRef ds:uri="http://purl.org/dc/elements/1.1/"/>
+    <ds:schemaRef ds:uri="http://purl.org/dc/terms/"/>
+    <ds:schemaRef ds:uri="http://schemas.microsoft.com/office/2006/documentManagement/types"/>
+    <ds:schemaRef ds:uri="http://schemas.microsoft.com/office/2006/metadata/properties"/>
+    <ds:schemaRef ds:uri="http://schemas.microsoft.com/office/infopath/2007/PartnerControls"/>
+    <ds:schemaRef ds:uri="http://schemas.openxmlformats.org/package/2006/metadata/core-properties"/>
+    <ds:schemaRef ds:uri="http://www.w3.org/XML/1998/namespace"/>
+  </ds:schemaRefs>
+</ds:datastoreItem>
+</file>
+
+<file path=customXml/itemProps3.xml><?xml version="1.0" encoding="utf-8"?>
+<ds:datastoreItem xmlns:ds="http://schemas.openxmlformats.org/officeDocument/2006/customXml" ds:itemID="{BEBDFA33-3959-412D-BF65-F572B77FF4EC}">
+  <ds:schemaRefs>
+    <ds:schemaRef ds:uri="http://schemas.microsoft.com/sharepoint/v3/contenttype/forms"/>
+  </ds:schemaRefs>
+</ds:datastoreItem>
+</file>
+
+<file path=customXml/itemProps4.xml><?xml version="1.0" encoding="utf-8"?>
 <ds:datastoreItem xmlns:ds="http://schemas.openxmlformats.org/officeDocument/2006/customXml" ds:itemID="{68ED3CC4-90A9-4466-8611-49F71BEF9534}">
   <ds:schemaRefs>
     <ds:schemaRef ds:uri="44a56295-c29e-4898-8136-a54736c65b82"/>
@@ -37412,29 +37437,4 @@
     <ds:schemaRef ds:uri="http://www.w3.org/2001/XMLSchema"/>
   </ds:schemaRefs>
 </ds:datastoreItem>
-</file>
-
-<file path=customXml/itemProps3.xml><?xml version="1.0" encoding="utf-8"?>
-<ds:datastoreItem xmlns:ds="http://schemas.openxmlformats.org/officeDocument/2006/customXml" ds:itemID="{BEBDFA33-3959-412D-BF65-F572B77FF4EC}">
-  <ds:schemaRefs>
-    <ds:schemaRef ds:uri="http://schemas.microsoft.com/sharepoint/v3/contenttype/forms"/>
-  </ds:schemaRefs>
-</ds:datastoreItem>
-</file>
-
-<file path=customXml/itemProps4.xml><?xml version="1.0" encoding="utf-8"?>
-<ds:datastoreItem xmlns:ds="http://schemas.openxmlformats.org/officeDocument/2006/customXml" ds:itemID="{9F6F5FD0-A94F-4E0E-8953-A634089166A9}">
-  <ds:schemaRefs>
-    <ds:schemaRef ds:uri="44a56295-c29e-4898-8136-a54736c65b82"/>
-    <ds:schemaRef ds:uri="9675ef8f-b755-4cd6-a742-8cae3d86c4fe"/>
-    <ds:schemaRef ds:uri="http://purl.org/dc/dcmitype/"/>
-    <ds:schemaRef ds:uri="http://purl.org/dc/elements/1.1/"/>
-    <ds:schemaRef ds:uri="http://purl.org/dc/terms/"/>
-    <ds:schemaRef ds:uri="http://schemas.microsoft.com/office/2006/documentManagement/types"/>
-    <ds:schemaRef ds:uri="http://schemas.microsoft.com/office/2006/metadata/properties"/>
-    <ds:schemaRef ds:uri="http://schemas.microsoft.com/office/infopath/2007/PartnerControls"/>
-    <ds:schemaRef ds:uri="http://schemas.openxmlformats.org/package/2006/metadata/core-properties"/>
-    <ds:schemaRef ds:uri="http://www.w3.org/XML/1998/namespace"/>
-  </ds:schemaRefs>
-</ds:datastoreItem>
 </file>
</xml_diff>